<commit_message>
Complete PPT from lecture 2
</commit_message>
<xml_diff>
--- a/Flask.pptx
+++ b/Flask.pptx
@@ -4,6 +4,9 @@
   <p:sldMasterIdLst>
     <p:sldMasterId id="2147483648" r:id="rId1"/>
   </p:sldMasterIdLst>
+  <p:notesMasterIdLst>
+    <p:notesMasterId r:id="rId20"/>
+  </p:notesMasterIdLst>
   <p:sldIdLst>
     <p:sldId id="256" r:id="rId2"/>
     <p:sldId id="257" r:id="rId3"/>
@@ -12,8 +15,17 @@
     <p:sldId id="260" r:id="rId6"/>
     <p:sldId id="261" r:id="rId7"/>
     <p:sldId id="262" r:id="rId8"/>
-    <p:sldId id="263" r:id="rId9"/>
-    <p:sldId id="264" r:id="rId10"/>
+    <p:sldId id="269" r:id="rId9"/>
+    <p:sldId id="263" r:id="rId10"/>
+    <p:sldId id="264" r:id="rId11"/>
+    <p:sldId id="265" r:id="rId12"/>
+    <p:sldId id="266" r:id="rId13"/>
+    <p:sldId id="267" r:id="rId14"/>
+    <p:sldId id="271" r:id="rId15"/>
+    <p:sldId id="275" r:id="rId16"/>
+    <p:sldId id="276" r:id="rId17"/>
+    <p:sldId id="270" r:id="rId18"/>
+    <p:sldId id="268" r:id="rId19"/>
   </p:sldIdLst>
   <p:sldSz cx="12192000" cy="6858000"/>
   <p:notesSz cx="6858000" cy="9144000"/>
@@ -120,6 +132,443 @@
 </p:presentation>
 </file>
 
+<file path=ppt/notesMasters/notesMaster1.xml><?xml version="1.0" encoding="utf-8"?>
+<p:notesMaster xmlns:a="http://schemas.openxmlformats.org/drawingml/2006/main" xmlns:r="http://schemas.openxmlformats.org/officeDocument/2006/relationships" xmlns:p="http://schemas.openxmlformats.org/presentationml/2006/main">
+  <p:cSld>
+    <p:bg>
+      <p:bgRef idx="1001">
+        <a:schemeClr val="bg1"/>
+      </p:bgRef>
+    </p:bg>
+    <p:spTree>
+      <p:nvGrpSpPr>
+        <p:cNvPr id="1" name=""/>
+        <p:cNvGrpSpPr/>
+        <p:nvPr/>
+      </p:nvGrpSpPr>
+      <p:grpSpPr>
+        <a:xfrm>
+          <a:off x="0" y="0"/>
+          <a:ext cx="0" cy="0"/>
+          <a:chOff x="0" y="0"/>
+          <a:chExt cx="0" cy="0"/>
+        </a:xfrm>
+      </p:grpSpPr>
+      <p:sp>
+        <p:nvSpPr>
+          <p:cNvPr id="2" name="Header Placeholder 1"/>
+          <p:cNvSpPr>
+            <a:spLocks noGrp="1"/>
+          </p:cNvSpPr>
+          <p:nvPr>
+            <p:ph type="hdr" sz="quarter"/>
+          </p:nvPr>
+        </p:nvSpPr>
+        <p:spPr>
+          <a:xfrm>
+            <a:off x="0" y="0"/>
+            <a:ext cx="2971800" cy="458788"/>
+          </a:xfrm>
+          <a:prstGeom prst="rect">
+            <a:avLst/>
+          </a:prstGeom>
+        </p:spPr>
+        <p:txBody>
+          <a:bodyPr vert="horz" lIns="91440" tIns="45720" rIns="91440" bIns="45720" rtlCol="0"/>
+          <a:lstStyle>
+            <a:lvl1pPr algn="l">
+              <a:defRPr sz="1200"/>
+            </a:lvl1pPr>
+          </a:lstStyle>
+          <a:p>
+            <a:endParaRPr lang="en-IN"/>
+          </a:p>
+        </p:txBody>
+      </p:sp>
+      <p:sp>
+        <p:nvSpPr>
+          <p:cNvPr id="3" name="Date Placeholder 2"/>
+          <p:cNvSpPr>
+            <a:spLocks noGrp="1"/>
+          </p:cNvSpPr>
+          <p:nvPr>
+            <p:ph type="dt" idx="1"/>
+          </p:nvPr>
+        </p:nvSpPr>
+        <p:spPr>
+          <a:xfrm>
+            <a:off x="3884613" y="0"/>
+            <a:ext cx="2971800" cy="458788"/>
+          </a:xfrm>
+          <a:prstGeom prst="rect">
+            <a:avLst/>
+          </a:prstGeom>
+        </p:spPr>
+        <p:txBody>
+          <a:bodyPr vert="horz" lIns="91440" tIns="45720" rIns="91440" bIns="45720" rtlCol="0"/>
+          <a:lstStyle>
+            <a:lvl1pPr algn="r">
+              <a:defRPr sz="1200"/>
+            </a:lvl1pPr>
+          </a:lstStyle>
+          <a:p>
+            <a:fld id="{AF443506-D510-40BE-A870-9973A527ED1F}" type="datetimeFigureOut">
+              <a:rPr lang="en-IN" smtClean="0"/>
+              <a:t>12-01-2020</a:t>
+            </a:fld>
+            <a:endParaRPr lang="en-IN"/>
+          </a:p>
+        </p:txBody>
+      </p:sp>
+      <p:sp>
+        <p:nvSpPr>
+          <p:cNvPr id="4" name="Slide Image Placeholder 3"/>
+          <p:cNvSpPr>
+            <a:spLocks noGrp="1" noRot="1" noChangeAspect="1"/>
+          </p:cNvSpPr>
+          <p:nvPr>
+            <p:ph type="sldImg" idx="2"/>
+          </p:nvPr>
+        </p:nvSpPr>
+        <p:spPr>
+          <a:xfrm>
+            <a:off x="685800" y="1143000"/>
+            <a:ext cx="5486400" cy="3086100"/>
+          </a:xfrm>
+          <a:prstGeom prst="rect">
+            <a:avLst/>
+          </a:prstGeom>
+          <a:noFill/>
+          <a:ln w="12700">
+            <a:solidFill>
+              <a:prstClr val="black"/>
+            </a:solidFill>
+          </a:ln>
+        </p:spPr>
+        <p:txBody>
+          <a:bodyPr vert="horz" lIns="91440" tIns="45720" rIns="91440" bIns="45720" rtlCol="0" anchor="ctr"/>
+          <a:lstStyle/>
+          <a:p>
+            <a:endParaRPr lang="en-IN"/>
+          </a:p>
+        </p:txBody>
+      </p:sp>
+      <p:sp>
+        <p:nvSpPr>
+          <p:cNvPr id="5" name="Notes Placeholder 4"/>
+          <p:cNvSpPr>
+            <a:spLocks noGrp="1"/>
+          </p:cNvSpPr>
+          <p:nvPr>
+            <p:ph type="body" sz="quarter" idx="3"/>
+          </p:nvPr>
+        </p:nvSpPr>
+        <p:spPr>
+          <a:xfrm>
+            <a:off x="685800" y="4400550"/>
+            <a:ext cx="5486400" cy="3600450"/>
+          </a:xfrm>
+          <a:prstGeom prst="rect">
+            <a:avLst/>
+          </a:prstGeom>
+        </p:spPr>
+        <p:txBody>
+          <a:bodyPr vert="horz" lIns="91440" tIns="45720" rIns="91440" bIns="45720" rtlCol="0"/>
+          <a:lstStyle/>
+          <a:p>
+            <a:pPr lvl="0"/>
+            <a:r>
+              <a:rPr lang="en-US"/>
+              <a:t>Click to edit Master text styles</a:t>
+            </a:r>
+          </a:p>
+          <a:p>
+            <a:pPr lvl="1"/>
+            <a:r>
+              <a:rPr lang="en-US"/>
+              <a:t>Second level</a:t>
+            </a:r>
+          </a:p>
+          <a:p>
+            <a:pPr lvl="2"/>
+            <a:r>
+              <a:rPr lang="en-US"/>
+              <a:t>Third level</a:t>
+            </a:r>
+          </a:p>
+          <a:p>
+            <a:pPr lvl="3"/>
+            <a:r>
+              <a:rPr lang="en-US"/>
+              <a:t>Fourth level</a:t>
+            </a:r>
+          </a:p>
+          <a:p>
+            <a:pPr lvl="4"/>
+            <a:r>
+              <a:rPr lang="en-US"/>
+              <a:t>Fifth level</a:t>
+            </a:r>
+            <a:endParaRPr lang="en-IN"/>
+          </a:p>
+        </p:txBody>
+      </p:sp>
+      <p:sp>
+        <p:nvSpPr>
+          <p:cNvPr id="6" name="Footer Placeholder 5"/>
+          <p:cNvSpPr>
+            <a:spLocks noGrp="1"/>
+          </p:cNvSpPr>
+          <p:nvPr>
+            <p:ph type="ftr" sz="quarter" idx="4"/>
+          </p:nvPr>
+        </p:nvSpPr>
+        <p:spPr>
+          <a:xfrm>
+            <a:off x="0" y="8685213"/>
+            <a:ext cx="2971800" cy="458787"/>
+          </a:xfrm>
+          <a:prstGeom prst="rect">
+            <a:avLst/>
+          </a:prstGeom>
+        </p:spPr>
+        <p:txBody>
+          <a:bodyPr vert="horz" lIns="91440" tIns="45720" rIns="91440" bIns="45720" rtlCol="0" anchor="b"/>
+          <a:lstStyle>
+            <a:lvl1pPr algn="l">
+              <a:defRPr sz="1200"/>
+            </a:lvl1pPr>
+          </a:lstStyle>
+          <a:p>
+            <a:endParaRPr lang="en-IN"/>
+          </a:p>
+        </p:txBody>
+      </p:sp>
+      <p:sp>
+        <p:nvSpPr>
+          <p:cNvPr id="7" name="Slide Number Placeholder 6"/>
+          <p:cNvSpPr>
+            <a:spLocks noGrp="1"/>
+          </p:cNvSpPr>
+          <p:nvPr>
+            <p:ph type="sldNum" sz="quarter" idx="5"/>
+          </p:nvPr>
+        </p:nvSpPr>
+        <p:spPr>
+          <a:xfrm>
+            <a:off x="3884613" y="8685213"/>
+            <a:ext cx="2971800" cy="458787"/>
+          </a:xfrm>
+          <a:prstGeom prst="rect">
+            <a:avLst/>
+          </a:prstGeom>
+        </p:spPr>
+        <p:txBody>
+          <a:bodyPr vert="horz" lIns="91440" tIns="45720" rIns="91440" bIns="45720" rtlCol="0" anchor="b"/>
+          <a:lstStyle>
+            <a:lvl1pPr algn="r">
+              <a:defRPr sz="1200"/>
+            </a:lvl1pPr>
+          </a:lstStyle>
+          <a:p>
+            <a:fld id="{D1C9AF1E-B985-47BE-AF55-9DB6D55A8253}" type="slidenum">
+              <a:rPr lang="en-IN" smtClean="0"/>
+              <a:t>‹#›</a:t>
+            </a:fld>
+            <a:endParaRPr lang="en-IN"/>
+          </a:p>
+        </p:txBody>
+      </p:sp>
+    </p:spTree>
+    <p:extLst>
+      <p:ext uri="{BB962C8B-B14F-4D97-AF65-F5344CB8AC3E}">
+        <p14:creationId xmlns:p14="http://schemas.microsoft.com/office/powerpoint/2010/main" val="2699767476"/>
+      </p:ext>
+    </p:extLst>
+  </p:cSld>
+  <p:clrMap bg1="lt1" tx1="dk1" bg2="lt2" tx2="dk2" accent1="accent1" accent2="accent2" accent3="accent3" accent4="accent4" accent5="accent5" accent6="accent6" hlink="hlink" folHlink="folHlink"/>
+  <p:notesStyle>
+    <a:lvl1pPr marL="0" algn="l" defTabSz="914400" rtl="0" eaLnBrk="1" latinLnBrk="0" hangingPunct="1">
+      <a:defRPr sz="1200" kern="1200">
+        <a:solidFill>
+          <a:schemeClr val="tx1"/>
+        </a:solidFill>
+        <a:latin typeface="+mn-lt"/>
+        <a:ea typeface="+mn-ea"/>
+        <a:cs typeface="+mn-cs"/>
+      </a:defRPr>
+    </a:lvl1pPr>
+    <a:lvl2pPr marL="457200" algn="l" defTabSz="914400" rtl="0" eaLnBrk="1" latinLnBrk="0" hangingPunct="1">
+      <a:defRPr sz="1200" kern="1200">
+        <a:solidFill>
+          <a:schemeClr val="tx1"/>
+        </a:solidFill>
+        <a:latin typeface="+mn-lt"/>
+        <a:ea typeface="+mn-ea"/>
+        <a:cs typeface="+mn-cs"/>
+      </a:defRPr>
+    </a:lvl2pPr>
+    <a:lvl3pPr marL="914400" algn="l" defTabSz="914400" rtl="0" eaLnBrk="1" latinLnBrk="0" hangingPunct="1">
+      <a:defRPr sz="1200" kern="1200">
+        <a:solidFill>
+          <a:schemeClr val="tx1"/>
+        </a:solidFill>
+        <a:latin typeface="+mn-lt"/>
+        <a:ea typeface="+mn-ea"/>
+        <a:cs typeface="+mn-cs"/>
+      </a:defRPr>
+    </a:lvl3pPr>
+    <a:lvl4pPr marL="1371600" algn="l" defTabSz="914400" rtl="0" eaLnBrk="1" latinLnBrk="0" hangingPunct="1">
+      <a:defRPr sz="1200" kern="1200">
+        <a:solidFill>
+          <a:schemeClr val="tx1"/>
+        </a:solidFill>
+        <a:latin typeface="+mn-lt"/>
+        <a:ea typeface="+mn-ea"/>
+        <a:cs typeface="+mn-cs"/>
+      </a:defRPr>
+    </a:lvl4pPr>
+    <a:lvl5pPr marL="1828800" algn="l" defTabSz="914400" rtl="0" eaLnBrk="1" latinLnBrk="0" hangingPunct="1">
+      <a:defRPr sz="1200" kern="1200">
+        <a:solidFill>
+          <a:schemeClr val="tx1"/>
+        </a:solidFill>
+        <a:latin typeface="+mn-lt"/>
+        <a:ea typeface="+mn-ea"/>
+        <a:cs typeface="+mn-cs"/>
+      </a:defRPr>
+    </a:lvl5pPr>
+    <a:lvl6pPr marL="2286000" algn="l" defTabSz="914400" rtl="0" eaLnBrk="1" latinLnBrk="0" hangingPunct="1">
+      <a:defRPr sz="1200" kern="1200">
+        <a:solidFill>
+          <a:schemeClr val="tx1"/>
+        </a:solidFill>
+        <a:latin typeface="+mn-lt"/>
+        <a:ea typeface="+mn-ea"/>
+        <a:cs typeface="+mn-cs"/>
+      </a:defRPr>
+    </a:lvl6pPr>
+    <a:lvl7pPr marL="2743200" algn="l" defTabSz="914400" rtl="0" eaLnBrk="1" latinLnBrk="0" hangingPunct="1">
+      <a:defRPr sz="1200" kern="1200">
+        <a:solidFill>
+          <a:schemeClr val="tx1"/>
+        </a:solidFill>
+        <a:latin typeface="+mn-lt"/>
+        <a:ea typeface="+mn-ea"/>
+        <a:cs typeface="+mn-cs"/>
+      </a:defRPr>
+    </a:lvl7pPr>
+    <a:lvl8pPr marL="3200400" algn="l" defTabSz="914400" rtl="0" eaLnBrk="1" latinLnBrk="0" hangingPunct="1">
+      <a:defRPr sz="1200" kern="1200">
+        <a:solidFill>
+          <a:schemeClr val="tx1"/>
+        </a:solidFill>
+        <a:latin typeface="+mn-lt"/>
+        <a:ea typeface="+mn-ea"/>
+        <a:cs typeface="+mn-cs"/>
+      </a:defRPr>
+    </a:lvl8pPr>
+    <a:lvl9pPr marL="3657600" algn="l" defTabSz="914400" rtl="0" eaLnBrk="1" latinLnBrk="0" hangingPunct="1">
+      <a:defRPr sz="1200" kern="1200">
+        <a:solidFill>
+          <a:schemeClr val="tx1"/>
+        </a:solidFill>
+        <a:latin typeface="+mn-lt"/>
+        <a:ea typeface="+mn-ea"/>
+        <a:cs typeface="+mn-cs"/>
+      </a:defRPr>
+    </a:lvl9pPr>
+  </p:notesStyle>
+</p:notesMaster>
+</file>
+
+<file path=ppt/notesSlides/notesSlide1.xml><?xml version="1.0" encoding="utf-8"?>
+<p:notes xmlns:a="http://schemas.openxmlformats.org/drawingml/2006/main" xmlns:r="http://schemas.openxmlformats.org/officeDocument/2006/relationships" xmlns:p="http://schemas.openxmlformats.org/presentationml/2006/main">
+  <p:cSld>
+    <p:spTree>
+      <p:nvGrpSpPr>
+        <p:cNvPr id="1" name=""/>
+        <p:cNvGrpSpPr/>
+        <p:nvPr/>
+      </p:nvGrpSpPr>
+      <p:grpSpPr>
+        <a:xfrm>
+          <a:off x="0" y="0"/>
+          <a:ext cx="0" cy="0"/>
+          <a:chOff x="0" y="0"/>
+          <a:chExt cx="0" cy="0"/>
+        </a:xfrm>
+      </p:grpSpPr>
+      <p:sp>
+        <p:nvSpPr>
+          <p:cNvPr id="2" name="Slide Image Placeholder 1"/>
+          <p:cNvSpPr>
+            <a:spLocks noGrp="1" noRot="1" noChangeAspect="1"/>
+          </p:cNvSpPr>
+          <p:nvPr>
+            <p:ph type="sldImg"/>
+          </p:nvPr>
+        </p:nvSpPr>
+        <p:spPr/>
+      </p:sp>
+      <p:sp>
+        <p:nvSpPr>
+          <p:cNvPr id="3" name="Notes Placeholder 2"/>
+          <p:cNvSpPr>
+            <a:spLocks noGrp="1"/>
+          </p:cNvSpPr>
+          <p:nvPr>
+            <p:ph type="body" idx="1"/>
+          </p:nvPr>
+        </p:nvSpPr>
+        <p:spPr/>
+        <p:txBody>
+          <a:bodyPr/>
+          <a:lstStyle/>
+          <a:p>
+            <a:r>
+              <a:rPr lang="en-US" dirty="0"/>
+              <a:t>Image credits: https://www.palletsprojects.com/p/flask/</a:t>
+            </a:r>
+          </a:p>
+        </p:txBody>
+      </p:sp>
+      <p:sp>
+        <p:nvSpPr>
+          <p:cNvPr id="4" name="Slide Number Placeholder 3"/>
+          <p:cNvSpPr>
+            <a:spLocks noGrp="1"/>
+          </p:cNvSpPr>
+          <p:nvPr>
+            <p:ph type="sldNum" sz="quarter" idx="5"/>
+          </p:nvPr>
+        </p:nvSpPr>
+        <p:spPr/>
+        <p:txBody>
+          <a:bodyPr/>
+          <a:lstStyle/>
+          <a:p>
+            <a:fld id="{D1C9AF1E-B985-47BE-AF55-9DB6D55A8253}" type="slidenum">
+              <a:rPr lang="en-IN" smtClean="0"/>
+              <a:t>5</a:t>
+            </a:fld>
+            <a:endParaRPr lang="en-IN"/>
+          </a:p>
+        </p:txBody>
+      </p:sp>
+    </p:spTree>
+    <p:extLst>
+      <p:ext uri="{BB962C8B-B14F-4D97-AF65-F5344CB8AC3E}">
+        <p14:creationId xmlns:p14="http://schemas.microsoft.com/office/powerpoint/2010/main" val="1068906643"/>
+      </p:ext>
+    </p:extLst>
+  </p:cSld>
+  <p:clrMapOvr>
+    <a:masterClrMapping/>
+  </p:clrMapOvr>
+</p:notes>
+</file>
+
 <file path=ppt/slideLayouts/slideLayout1.xml><?xml version="1.0" encoding="utf-8"?>
 <p:sldLayout xmlns:a="http://schemas.openxmlformats.org/drawingml/2006/main" xmlns:r="http://schemas.openxmlformats.org/officeDocument/2006/relationships" xmlns:p="http://schemas.openxmlformats.org/presentationml/2006/main" type="title" preserve="1">
   <p:cSld name="Title Slide">
@@ -142,7 +591,7 @@
           <p:cNvPr id="2" name="Title 1">
             <a:extLst>
               <a:ext uri="{FF2B5EF4-FFF2-40B4-BE49-F238E27FC236}">
-                <a16:creationId xmlns:a16="http://schemas.microsoft.com/office/drawing/2014/main" id="{51BD69B1-8D47-4908-84F9-3455F6814C43}"/>
+                <a16:creationId xmlns:a16="http://schemas.microsoft.com/office/drawing/2014/main" id="{3E9DC71B-DF13-4240-B898-CD5D5D9D8B88}"/>
               </a:ext>
             </a:extLst>
           </p:cNvPr>
@@ -180,7 +629,7 @@
           <p:cNvPr id="3" name="Subtitle 2">
             <a:extLst>
               <a:ext uri="{FF2B5EF4-FFF2-40B4-BE49-F238E27FC236}">
-                <a16:creationId xmlns:a16="http://schemas.microsoft.com/office/drawing/2014/main" id="{F133CC83-6FB2-476F-9482-0CBD4992CE0B}"/>
+                <a16:creationId xmlns:a16="http://schemas.microsoft.com/office/drawing/2014/main" id="{674E1A04-2090-4793-B46E-4B85577952C0}"/>
               </a:ext>
             </a:extLst>
           </p:cNvPr>
@@ -251,7 +700,7 @@
           <p:cNvPr id="4" name="Date Placeholder 3">
             <a:extLst>
               <a:ext uri="{FF2B5EF4-FFF2-40B4-BE49-F238E27FC236}">
-                <a16:creationId xmlns:a16="http://schemas.microsoft.com/office/drawing/2014/main" id="{E9A71A83-2BA6-4044-90D7-5738F4A579EC}"/>
+                <a16:creationId xmlns:a16="http://schemas.microsoft.com/office/drawing/2014/main" id="{86BC1D5B-F31D-4CD8-82EF-FCC145E16A18}"/>
               </a:ext>
             </a:extLst>
           </p:cNvPr>
@@ -267,9 +716,9 @@
           <a:bodyPr/>
           <a:lstStyle/>
           <a:p>
-            <a:fld id="{CA3F6D65-D313-4FE3-9FC2-6EE31A8B66DB}" type="datetimeFigureOut">
+            <a:fld id="{CDD6DE72-0FFC-4B3C-9BEB-F665F701F1AA}" type="datetimeFigureOut">
               <a:rPr lang="en-IN" smtClean="0"/>
-              <a:t>07-09-2019</a:t>
+              <a:t>12-01-2020</a:t>
             </a:fld>
             <a:endParaRPr lang="en-IN"/>
           </a:p>
@@ -280,7 +729,7 @@
           <p:cNvPr id="5" name="Footer Placeholder 4">
             <a:extLst>
               <a:ext uri="{FF2B5EF4-FFF2-40B4-BE49-F238E27FC236}">
-                <a16:creationId xmlns:a16="http://schemas.microsoft.com/office/drawing/2014/main" id="{53B12146-F5E1-4BC2-AFFC-FDEEB50856B5}"/>
+                <a16:creationId xmlns:a16="http://schemas.microsoft.com/office/drawing/2014/main" id="{783977D1-ABAA-45AB-9636-8C1A8F09F974}"/>
               </a:ext>
             </a:extLst>
           </p:cNvPr>
@@ -305,7 +754,7 @@
           <p:cNvPr id="6" name="Slide Number Placeholder 5">
             <a:extLst>
               <a:ext uri="{FF2B5EF4-FFF2-40B4-BE49-F238E27FC236}">
-                <a16:creationId xmlns:a16="http://schemas.microsoft.com/office/drawing/2014/main" id="{A3088E85-18E2-415E-B1D8-C465A1E3B5DB}"/>
+                <a16:creationId xmlns:a16="http://schemas.microsoft.com/office/drawing/2014/main" id="{4293B0EE-B1C9-4A62-9894-D6882ACE66D1}"/>
               </a:ext>
             </a:extLst>
           </p:cNvPr>
@@ -321,7 +770,7 @@
           <a:bodyPr/>
           <a:lstStyle/>
           <a:p>
-            <a:fld id="{D9C21DE9-720D-4D94-9868-9756A43D1FF2}" type="slidenum">
+            <a:fld id="{8753B5A3-119B-4152-BC9A-B6AE5BEF1782}" type="slidenum">
               <a:rPr lang="en-IN" smtClean="0"/>
               <a:t>‹#›</a:t>
             </a:fld>
@@ -332,7 +781,7 @@
     </p:spTree>
     <p:extLst>
       <p:ext uri="{BB962C8B-B14F-4D97-AF65-F5344CB8AC3E}">
-        <p14:creationId xmlns:p14="http://schemas.microsoft.com/office/powerpoint/2010/main" val="4219986441"/>
+        <p14:creationId xmlns:p14="http://schemas.microsoft.com/office/powerpoint/2010/main" val="700181153"/>
       </p:ext>
     </p:extLst>
   </p:cSld>
@@ -364,7 +813,7 @@
           <p:cNvPr id="2" name="Title 1">
             <a:extLst>
               <a:ext uri="{FF2B5EF4-FFF2-40B4-BE49-F238E27FC236}">
-                <a16:creationId xmlns:a16="http://schemas.microsoft.com/office/drawing/2014/main" id="{37BC5CE6-5418-41BA-A4F3-34481B2BDF3D}"/>
+                <a16:creationId xmlns:a16="http://schemas.microsoft.com/office/drawing/2014/main" id="{0B66203E-DBE2-40A9-A193-DAC20A5776C5}"/>
               </a:ext>
             </a:extLst>
           </p:cNvPr>
@@ -393,7 +842,7 @@
           <p:cNvPr id="3" name="Vertical Text Placeholder 2">
             <a:extLst>
               <a:ext uri="{FF2B5EF4-FFF2-40B4-BE49-F238E27FC236}">
-                <a16:creationId xmlns:a16="http://schemas.microsoft.com/office/drawing/2014/main" id="{74BD3761-6CCB-436E-8B69-D9A27CF8FE57}"/>
+                <a16:creationId xmlns:a16="http://schemas.microsoft.com/office/drawing/2014/main" id="{3DF2C2DE-16C4-4F12-B4FC-70F16402E82E}"/>
               </a:ext>
             </a:extLst>
           </p:cNvPr>
@@ -412,7 +861,7 @@
             <a:pPr lvl="0"/>
             <a:r>
               <a:rPr lang="en-US"/>
-              <a:t>Edit Master text styles</a:t>
+              <a:t>Click to edit Master text styles</a:t>
             </a:r>
           </a:p>
           <a:p>
@@ -451,7 +900,7 @@
           <p:cNvPr id="4" name="Date Placeholder 3">
             <a:extLst>
               <a:ext uri="{FF2B5EF4-FFF2-40B4-BE49-F238E27FC236}">
-                <a16:creationId xmlns:a16="http://schemas.microsoft.com/office/drawing/2014/main" id="{630CF877-443E-4A30-A284-48775770B556}"/>
+                <a16:creationId xmlns:a16="http://schemas.microsoft.com/office/drawing/2014/main" id="{E92CF370-5D36-4755-AAAA-306F21DEE45D}"/>
               </a:ext>
             </a:extLst>
           </p:cNvPr>
@@ -467,9 +916,9 @@
           <a:bodyPr/>
           <a:lstStyle/>
           <a:p>
-            <a:fld id="{CA3F6D65-D313-4FE3-9FC2-6EE31A8B66DB}" type="datetimeFigureOut">
+            <a:fld id="{CDD6DE72-0FFC-4B3C-9BEB-F665F701F1AA}" type="datetimeFigureOut">
               <a:rPr lang="en-IN" smtClean="0"/>
-              <a:t>07-09-2019</a:t>
+              <a:t>12-01-2020</a:t>
             </a:fld>
             <a:endParaRPr lang="en-IN"/>
           </a:p>
@@ -480,7 +929,7 @@
           <p:cNvPr id="5" name="Footer Placeholder 4">
             <a:extLst>
               <a:ext uri="{FF2B5EF4-FFF2-40B4-BE49-F238E27FC236}">
-                <a16:creationId xmlns:a16="http://schemas.microsoft.com/office/drawing/2014/main" id="{2196D078-37E9-4C0A-9799-8FD90D436C72}"/>
+                <a16:creationId xmlns:a16="http://schemas.microsoft.com/office/drawing/2014/main" id="{5964D633-C578-4CF2-AE56-8CE20CFA8B27}"/>
               </a:ext>
             </a:extLst>
           </p:cNvPr>
@@ -505,7 +954,7 @@
           <p:cNvPr id="6" name="Slide Number Placeholder 5">
             <a:extLst>
               <a:ext uri="{FF2B5EF4-FFF2-40B4-BE49-F238E27FC236}">
-                <a16:creationId xmlns:a16="http://schemas.microsoft.com/office/drawing/2014/main" id="{93CED75A-D483-4CBF-AE22-61224BC86EBE}"/>
+                <a16:creationId xmlns:a16="http://schemas.microsoft.com/office/drawing/2014/main" id="{5DA64D6C-1E26-49DC-BE04-F53BED87BEA0}"/>
               </a:ext>
             </a:extLst>
           </p:cNvPr>
@@ -521,7 +970,7 @@
           <a:bodyPr/>
           <a:lstStyle/>
           <a:p>
-            <a:fld id="{D9C21DE9-720D-4D94-9868-9756A43D1FF2}" type="slidenum">
+            <a:fld id="{8753B5A3-119B-4152-BC9A-B6AE5BEF1782}" type="slidenum">
               <a:rPr lang="en-IN" smtClean="0"/>
               <a:t>‹#›</a:t>
             </a:fld>
@@ -532,7 +981,7 @@
     </p:spTree>
     <p:extLst>
       <p:ext uri="{BB962C8B-B14F-4D97-AF65-F5344CB8AC3E}">
-        <p14:creationId xmlns:p14="http://schemas.microsoft.com/office/powerpoint/2010/main" val="1401111070"/>
+        <p14:creationId xmlns:p14="http://schemas.microsoft.com/office/powerpoint/2010/main" val="4044356114"/>
       </p:ext>
     </p:extLst>
   </p:cSld>
@@ -564,7 +1013,7 @@
           <p:cNvPr id="2" name="Vertical Title 1">
             <a:extLst>
               <a:ext uri="{FF2B5EF4-FFF2-40B4-BE49-F238E27FC236}">
-                <a16:creationId xmlns:a16="http://schemas.microsoft.com/office/drawing/2014/main" id="{691DC0A6-C87F-40ED-9400-1110BDAA762D}"/>
+                <a16:creationId xmlns:a16="http://schemas.microsoft.com/office/drawing/2014/main" id="{835EBBE6-C3BE-43BC-AABB-1EC7B3C7C0A6}"/>
               </a:ext>
             </a:extLst>
           </p:cNvPr>
@@ -598,7 +1047,7 @@
           <p:cNvPr id="3" name="Vertical Text Placeholder 2">
             <a:extLst>
               <a:ext uri="{FF2B5EF4-FFF2-40B4-BE49-F238E27FC236}">
-                <a16:creationId xmlns:a16="http://schemas.microsoft.com/office/drawing/2014/main" id="{4EBDBA09-9E58-478C-80EA-EE4E6186E719}"/>
+                <a16:creationId xmlns:a16="http://schemas.microsoft.com/office/drawing/2014/main" id="{C385C6D9-27A0-4D26-A3F9-CA0F2E3678EB}"/>
               </a:ext>
             </a:extLst>
           </p:cNvPr>
@@ -622,7 +1071,7 @@
             <a:pPr lvl="0"/>
             <a:r>
               <a:rPr lang="en-US"/>
-              <a:t>Edit Master text styles</a:t>
+              <a:t>Click to edit Master text styles</a:t>
             </a:r>
           </a:p>
           <a:p>
@@ -661,7 +1110,7 @@
           <p:cNvPr id="4" name="Date Placeholder 3">
             <a:extLst>
               <a:ext uri="{FF2B5EF4-FFF2-40B4-BE49-F238E27FC236}">
-                <a16:creationId xmlns:a16="http://schemas.microsoft.com/office/drawing/2014/main" id="{9DED27F5-F657-43BA-A23C-282EAC93CF15}"/>
+                <a16:creationId xmlns:a16="http://schemas.microsoft.com/office/drawing/2014/main" id="{8B7BF00E-1B1A-4DA6-A389-23C9F6ADEF7B}"/>
               </a:ext>
             </a:extLst>
           </p:cNvPr>
@@ -677,9 +1126,9 @@
           <a:bodyPr/>
           <a:lstStyle/>
           <a:p>
-            <a:fld id="{CA3F6D65-D313-4FE3-9FC2-6EE31A8B66DB}" type="datetimeFigureOut">
+            <a:fld id="{CDD6DE72-0FFC-4B3C-9BEB-F665F701F1AA}" type="datetimeFigureOut">
               <a:rPr lang="en-IN" smtClean="0"/>
-              <a:t>07-09-2019</a:t>
+              <a:t>12-01-2020</a:t>
             </a:fld>
             <a:endParaRPr lang="en-IN"/>
           </a:p>
@@ -690,7 +1139,7 @@
           <p:cNvPr id="5" name="Footer Placeholder 4">
             <a:extLst>
               <a:ext uri="{FF2B5EF4-FFF2-40B4-BE49-F238E27FC236}">
-                <a16:creationId xmlns:a16="http://schemas.microsoft.com/office/drawing/2014/main" id="{720BF0C6-BBAF-49A1-83C8-A27EE2C2AA6C}"/>
+                <a16:creationId xmlns:a16="http://schemas.microsoft.com/office/drawing/2014/main" id="{C5B0A9E7-170A-424E-991B-E5614E936F9E}"/>
               </a:ext>
             </a:extLst>
           </p:cNvPr>
@@ -715,7 +1164,7 @@
           <p:cNvPr id="6" name="Slide Number Placeholder 5">
             <a:extLst>
               <a:ext uri="{FF2B5EF4-FFF2-40B4-BE49-F238E27FC236}">
-                <a16:creationId xmlns:a16="http://schemas.microsoft.com/office/drawing/2014/main" id="{E8A2CAE5-1657-49F4-A8AE-A3FF4567E947}"/>
+                <a16:creationId xmlns:a16="http://schemas.microsoft.com/office/drawing/2014/main" id="{19632A80-23B5-4854-93DD-44415B2831DE}"/>
               </a:ext>
             </a:extLst>
           </p:cNvPr>
@@ -731,7 +1180,7 @@
           <a:bodyPr/>
           <a:lstStyle/>
           <a:p>
-            <a:fld id="{D9C21DE9-720D-4D94-9868-9756A43D1FF2}" type="slidenum">
+            <a:fld id="{8753B5A3-119B-4152-BC9A-B6AE5BEF1782}" type="slidenum">
               <a:rPr lang="en-IN" smtClean="0"/>
               <a:t>‹#›</a:t>
             </a:fld>
@@ -742,7 +1191,7 @@
     </p:spTree>
     <p:extLst>
       <p:ext uri="{BB962C8B-B14F-4D97-AF65-F5344CB8AC3E}">
-        <p14:creationId xmlns:p14="http://schemas.microsoft.com/office/powerpoint/2010/main" val="1826345305"/>
+        <p14:creationId xmlns:p14="http://schemas.microsoft.com/office/powerpoint/2010/main" val="3569428798"/>
       </p:ext>
     </p:extLst>
   </p:cSld>
@@ -774,7 +1223,7 @@
           <p:cNvPr id="2" name="Title 1">
             <a:extLst>
               <a:ext uri="{FF2B5EF4-FFF2-40B4-BE49-F238E27FC236}">
-                <a16:creationId xmlns:a16="http://schemas.microsoft.com/office/drawing/2014/main" id="{021A9418-B6D3-451A-8332-6517E8543385}"/>
+                <a16:creationId xmlns:a16="http://schemas.microsoft.com/office/drawing/2014/main" id="{8C38A327-585C-41F7-8E52-CD628A76DFAD}"/>
               </a:ext>
             </a:extLst>
           </p:cNvPr>
@@ -803,7 +1252,7 @@
           <p:cNvPr id="3" name="Content Placeholder 2">
             <a:extLst>
               <a:ext uri="{FF2B5EF4-FFF2-40B4-BE49-F238E27FC236}">
-                <a16:creationId xmlns:a16="http://schemas.microsoft.com/office/drawing/2014/main" id="{8AFFA2E5-A4D6-4160-B151-EBB4C62475D7}"/>
+                <a16:creationId xmlns:a16="http://schemas.microsoft.com/office/drawing/2014/main" id="{81B0ED51-5DEB-4035-8588-1028563B6738}"/>
               </a:ext>
             </a:extLst>
           </p:cNvPr>
@@ -822,7 +1271,7 @@
             <a:pPr lvl="0"/>
             <a:r>
               <a:rPr lang="en-US"/>
-              <a:t>Edit Master text styles</a:t>
+              <a:t>Click to edit Master text styles</a:t>
             </a:r>
           </a:p>
           <a:p>
@@ -861,7 +1310,7 @@
           <p:cNvPr id="4" name="Date Placeholder 3">
             <a:extLst>
               <a:ext uri="{FF2B5EF4-FFF2-40B4-BE49-F238E27FC236}">
-                <a16:creationId xmlns:a16="http://schemas.microsoft.com/office/drawing/2014/main" id="{44E7ADF2-E188-46D5-B943-2EF128A6640C}"/>
+                <a16:creationId xmlns:a16="http://schemas.microsoft.com/office/drawing/2014/main" id="{8E7EF7F5-62F5-43CF-8830-40AC6353670F}"/>
               </a:ext>
             </a:extLst>
           </p:cNvPr>
@@ -877,9 +1326,9 @@
           <a:bodyPr/>
           <a:lstStyle/>
           <a:p>
-            <a:fld id="{CA3F6D65-D313-4FE3-9FC2-6EE31A8B66DB}" type="datetimeFigureOut">
+            <a:fld id="{CDD6DE72-0FFC-4B3C-9BEB-F665F701F1AA}" type="datetimeFigureOut">
               <a:rPr lang="en-IN" smtClean="0"/>
-              <a:t>07-09-2019</a:t>
+              <a:t>12-01-2020</a:t>
             </a:fld>
             <a:endParaRPr lang="en-IN"/>
           </a:p>
@@ -890,7 +1339,7 @@
           <p:cNvPr id="5" name="Footer Placeholder 4">
             <a:extLst>
               <a:ext uri="{FF2B5EF4-FFF2-40B4-BE49-F238E27FC236}">
-                <a16:creationId xmlns:a16="http://schemas.microsoft.com/office/drawing/2014/main" id="{AAC5A0CB-84B1-4CB5-AE5D-0BE02559BC82}"/>
+                <a16:creationId xmlns:a16="http://schemas.microsoft.com/office/drawing/2014/main" id="{628C5D22-5B88-45E5-B803-253D88E3403A}"/>
               </a:ext>
             </a:extLst>
           </p:cNvPr>
@@ -915,7 +1364,7 @@
           <p:cNvPr id="6" name="Slide Number Placeholder 5">
             <a:extLst>
               <a:ext uri="{FF2B5EF4-FFF2-40B4-BE49-F238E27FC236}">
-                <a16:creationId xmlns:a16="http://schemas.microsoft.com/office/drawing/2014/main" id="{5F9C4D5D-5230-48FD-9E4C-8D9AF784D455}"/>
+                <a16:creationId xmlns:a16="http://schemas.microsoft.com/office/drawing/2014/main" id="{881A9B8F-35CE-4705-83C9-96B52133C92F}"/>
               </a:ext>
             </a:extLst>
           </p:cNvPr>
@@ -931,7 +1380,7 @@
           <a:bodyPr/>
           <a:lstStyle/>
           <a:p>
-            <a:fld id="{D9C21DE9-720D-4D94-9868-9756A43D1FF2}" type="slidenum">
+            <a:fld id="{8753B5A3-119B-4152-BC9A-B6AE5BEF1782}" type="slidenum">
               <a:rPr lang="en-IN" smtClean="0"/>
               <a:t>‹#›</a:t>
             </a:fld>
@@ -942,7 +1391,7 @@
     </p:spTree>
     <p:extLst>
       <p:ext uri="{BB962C8B-B14F-4D97-AF65-F5344CB8AC3E}">
-        <p14:creationId xmlns:p14="http://schemas.microsoft.com/office/powerpoint/2010/main" val="761885846"/>
+        <p14:creationId xmlns:p14="http://schemas.microsoft.com/office/powerpoint/2010/main" val="2563031399"/>
       </p:ext>
     </p:extLst>
   </p:cSld>
@@ -974,7 +1423,7 @@
           <p:cNvPr id="2" name="Title 1">
             <a:extLst>
               <a:ext uri="{FF2B5EF4-FFF2-40B4-BE49-F238E27FC236}">
-                <a16:creationId xmlns:a16="http://schemas.microsoft.com/office/drawing/2014/main" id="{AE8B40FE-A717-46D7-A13B-EF87FFBF6102}"/>
+                <a16:creationId xmlns:a16="http://schemas.microsoft.com/office/drawing/2014/main" id="{A2706DDA-1D4E-48AA-8486-E69AC99C2CA2}"/>
               </a:ext>
             </a:extLst>
           </p:cNvPr>
@@ -1012,7 +1461,7 @@
           <p:cNvPr id="3" name="Text Placeholder 2">
             <a:extLst>
               <a:ext uri="{FF2B5EF4-FFF2-40B4-BE49-F238E27FC236}">
-                <a16:creationId xmlns:a16="http://schemas.microsoft.com/office/drawing/2014/main" id="{8C4E1FB9-8A54-4EE9-99A1-4B2D467934EE}"/>
+                <a16:creationId xmlns:a16="http://schemas.microsoft.com/office/drawing/2014/main" id="{0B6AC10D-6B1C-46B2-B4D7-1B74196EDD39}"/>
               </a:ext>
             </a:extLst>
           </p:cNvPr>
@@ -1127,7 +1576,7 @@
             <a:pPr lvl="0"/>
             <a:r>
               <a:rPr lang="en-US"/>
-              <a:t>Edit Master text styles</a:t>
+              <a:t>Click to edit Master text styles</a:t>
             </a:r>
           </a:p>
         </p:txBody>
@@ -1137,7 +1586,7 @@
           <p:cNvPr id="4" name="Date Placeholder 3">
             <a:extLst>
               <a:ext uri="{FF2B5EF4-FFF2-40B4-BE49-F238E27FC236}">
-                <a16:creationId xmlns:a16="http://schemas.microsoft.com/office/drawing/2014/main" id="{DA2A22AE-1C75-4A99-9F8F-E8F438CEF645}"/>
+                <a16:creationId xmlns:a16="http://schemas.microsoft.com/office/drawing/2014/main" id="{12821FF1-907E-43B0-BAED-3B7579501C21}"/>
               </a:ext>
             </a:extLst>
           </p:cNvPr>
@@ -1153,9 +1602,9 @@
           <a:bodyPr/>
           <a:lstStyle/>
           <a:p>
-            <a:fld id="{CA3F6D65-D313-4FE3-9FC2-6EE31A8B66DB}" type="datetimeFigureOut">
+            <a:fld id="{CDD6DE72-0FFC-4B3C-9BEB-F665F701F1AA}" type="datetimeFigureOut">
               <a:rPr lang="en-IN" smtClean="0"/>
-              <a:t>07-09-2019</a:t>
+              <a:t>12-01-2020</a:t>
             </a:fld>
             <a:endParaRPr lang="en-IN"/>
           </a:p>
@@ -1166,7 +1615,7 @@
           <p:cNvPr id="5" name="Footer Placeholder 4">
             <a:extLst>
               <a:ext uri="{FF2B5EF4-FFF2-40B4-BE49-F238E27FC236}">
-                <a16:creationId xmlns:a16="http://schemas.microsoft.com/office/drawing/2014/main" id="{0BFB3298-0088-4EDB-B3A6-867573C365B4}"/>
+                <a16:creationId xmlns:a16="http://schemas.microsoft.com/office/drawing/2014/main" id="{12F348C6-2B92-48B5-89C3-BC3C5A76BA8A}"/>
               </a:ext>
             </a:extLst>
           </p:cNvPr>
@@ -1191,7 +1640,7 @@
           <p:cNvPr id="6" name="Slide Number Placeholder 5">
             <a:extLst>
               <a:ext uri="{FF2B5EF4-FFF2-40B4-BE49-F238E27FC236}">
-                <a16:creationId xmlns:a16="http://schemas.microsoft.com/office/drawing/2014/main" id="{3777FBF4-D593-4CB7-BF64-C6A28294C796}"/>
+                <a16:creationId xmlns:a16="http://schemas.microsoft.com/office/drawing/2014/main" id="{2CF6A224-95E4-4899-9B47-FA8D6EEB53E9}"/>
               </a:ext>
             </a:extLst>
           </p:cNvPr>
@@ -1207,7 +1656,7 @@
           <a:bodyPr/>
           <a:lstStyle/>
           <a:p>
-            <a:fld id="{D9C21DE9-720D-4D94-9868-9756A43D1FF2}" type="slidenum">
+            <a:fld id="{8753B5A3-119B-4152-BC9A-B6AE5BEF1782}" type="slidenum">
               <a:rPr lang="en-IN" smtClean="0"/>
               <a:t>‹#›</a:t>
             </a:fld>
@@ -1218,7 +1667,7 @@
     </p:spTree>
     <p:extLst>
       <p:ext uri="{BB962C8B-B14F-4D97-AF65-F5344CB8AC3E}">
-        <p14:creationId xmlns:p14="http://schemas.microsoft.com/office/powerpoint/2010/main" val="1214001751"/>
+        <p14:creationId xmlns:p14="http://schemas.microsoft.com/office/powerpoint/2010/main" val="4293137737"/>
       </p:ext>
     </p:extLst>
   </p:cSld>
@@ -1250,7 +1699,7 @@
           <p:cNvPr id="2" name="Title 1">
             <a:extLst>
               <a:ext uri="{FF2B5EF4-FFF2-40B4-BE49-F238E27FC236}">
-                <a16:creationId xmlns:a16="http://schemas.microsoft.com/office/drawing/2014/main" id="{935D6706-FB02-4EDC-BF35-B5D1A71BBC49}"/>
+                <a16:creationId xmlns:a16="http://schemas.microsoft.com/office/drawing/2014/main" id="{AA3B0823-5C8D-47D3-A611-E4EB8A01DD6D}"/>
               </a:ext>
             </a:extLst>
           </p:cNvPr>
@@ -1279,7 +1728,7 @@
           <p:cNvPr id="3" name="Content Placeholder 2">
             <a:extLst>
               <a:ext uri="{FF2B5EF4-FFF2-40B4-BE49-F238E27FC236}">
-                <a16:creationId xmlns:a16="http://schemas.microsoft.com/office/drawing/2014/main" id="{DB8B3C03-D1C3-46CF-8921-0689100876A5}"/>
+                <a16:creationId xmlns:a16="http://schemas.microsoft.com/office/drawing/2014/main" id="{7F90F5F2-D3EC-4D42-A695-E53A5B0E7ED0}"/>
               </a:ext>
             </a:extLst>
           </p:cNvPr>
@@ -1303,7 +1752,7 @@
             <a:pPr lvl="0"/>
             <a:r>
               <a:rPr lang="en-US"/>
-              <a:t>Edit Master text styles</a:t>
+              <a:t>Click to edit Master text styles</a:t>
             </a:r>
           </a:p>
           <a:p>
@@ -1342,7 +1791,7 @@
           <p:cNvPr id="4" name="Content Placeholder 3">
             <a:extLst>
               <a:ext uri="{FF2B5EF4-FFF2-40B4-BE49-F238E27FC236}">
-                <a16:creationId xmlns:a16="http://schemas.microsoft.com/office/drawing/2014/main" id="{35290843-72FC-46DA-A9C2-5C89B3A8A971}"/>
+                <a16:creationId xmlns:a16="http://schemas.microsoft.com/office/drawing/2014/main" id="{80F8E942-488F-45AD-B5BD-E48697E38304}"/>
               </a:ext>
             </a:extLst>
           </p:cNvPr>
@@ -1366,7 +1815,7 @@
             <a:pPr lvl="0"/>
             <a:r>
               <a:rPr lang="en-US"/>
-              <a:t>Edit Master text styles</a:t>
+              <a:t>Click to edit Master text styles</a:t>
             </a:r>
           </a:p>
           <a:p>
@@ -1405,7 +1854,7 @@
           <p:cNvPr id="5" name="Date Placeholder 4">
             <a:extLst>
               <a:ext uri="{FF2B5EF4-FFF2-40B4-BE49-F238E27FC236}">
-                <a16:creationId xmlns:a16="http://schemas.microsoft.com/office/drawing/2014/main" id="{0FED15BC-9B58-45DF-9498-6660FBA826E7}"/>
+                <a16:creationId xmlns:a16="http://schemas.microsoft.com/office/drawing/2014/main" id="{283CDB0B-A566-4071-BA4D-10B30485672A}"/>
               </a:ext>
             </a:extLst>
           </p:cNvPr>
@@ -1421,9 +1870,9 @@
           <a:bodyPr/>
           <a:lstStyle/>
           <a:p>
-            <a:fld id="{CA3F6D65-D313-4FE3-9FC2-6EE31A8B66DB}" type="datetimeFigureOut">
+            <a:fld id="{CDD6DE72-0FFC-4B3C-9BEB-F665F701F1AA}" type="datetimeFigureOut">
               <a:rPr lang="en-IN" smtClean="0"/>
-              <a:t>07-09-2019</a:t>
+              <a:t>12-01-2020</a:t>
             </a:fld>
             <a:endParaRPr lang="en-IN"/>
           </a:p>
@@ -1434,7 +1883,7 @@
           <p:cNvPr id="6" name="Footer Placeholder 5">
             <a:extLst>
               <a:ext uri="{FF2B5EF4-FFF2-40B4-BE49-F238E27FC236}">
-                <a16:creationId xmlns:a16="http://schemas.microsoft.com/office/drawing/2014/main" id="{63133D77-0E02-4CB9-9A0B-4D374548A9E9}"/>
+                <a16:creationId xmlns:a16="http://schemas.microsoft.com/office/drawing/2014/main" id="{2A3B9349-2435-4B73-A633-EBB0990DE93C}"/>
               </a:ext>
             </a:extLst>
           </p:cNvPr>
@@ -1459,7 +1908,7 @@
           <p:cNvPr id="7" name="Slide Number Placeholder 6">
             <a:extLst>
               <a:ext uri="{FF2B5EF4-FFF2-40B4-BE49-F238E27FC236}">
-                <a16:creationId xmlns:a16="http://schemas.microsoft.com/office/drawing/2014/main" id="{2695B85A-1140-4ECC-850E-C1EFB44EF67E}"/>
+                <a16:creationId xmlns:a16="http://schemas.microsoft.com/office/drawing/2014/main" id="{33384D94-C124-4470-8632-F877849C7E54}"/>
               </a:ext>
             </a:extLst>
           </p:cNvPr>
@@ -1475,7 +1924,7 @@
           <a:bodyPr/>
           <a:lstStyle/>
           <a:p>
-            <a:fld id="{D9C21DE9-720D-4D94-9868-9756A43D1FF2}" type="slidenum">
+            <a:fld id="{8753B5A3-119B-4152-BC9A-B6AE5BEF1782}" type="slidenum">
               <a:rPr lang="en-IN" smtClean="0"/>
               <a:t>‹#›</a:t>
             </a:fld>
@@ -1486,7 +1935,7 @@
     </p:spTree>
     <p:extLst>
       <p:ext uri="{BB962C8B-B14F-4D97-AF65-F5344CB8AC3E}">
-        <p14:creationId xmlns:p14="http://schemas.microsoft.com/office/powerpoint/2010/main" val="2218626201"/>
+        <p14:creationId xmlns:p14="http://schemas.microsoft.com/office/powerpoint/2010/main" val="725472944"/>
       </p:ext>
     </p:extLst>
   </p:cSld>
@@ -1518,7 +1967,7 @@
           <p:cNvPr id="2" name="Title 1">
             <a:extLst>
               <a:ext uri="{FF2B5EF4-FFF2-40B4-BE49-F238E27FC236}">
-                <a16:creationId xmlns:a16="http://schemas.microsoft.com/office/drawing/2014/main" id="{7B37CC88-A42D-4DAB-8FED-D9F8B81BBC9F}"/>
+                <a16:creationId xmlns:a16="http://schemas.microsoft.com/office/drawing/2014/main" id="{E59BB709-4BB5-42E1-A974-8B874B9BD364}"/>
               </a:ext>
             </a:extLst>
           </p:cNvPr>
@@ -1552,7 +2001,7 @@
           <p:cNvPr id="3" name="Text Placeholder 2">
             <a:extLst>
               <a:ext uri="{FF2B5EF4-FFF2-40B4-BE49-F238E27FC236}">
-                <a16:creationId xmlns:a16="http://schemas.microsoft.com/office/drawing/2014/main" id="{E721669C-6470-49A9-9210-F800AB12828C}"/>
+                <a16:creationId xmlns:a16="http://schemas.microsoft.com/office/drawing/2014/main" id="{4B0ADA8E-FF98-44F1-B389-040E1E25DAAF}"/>
               </a:ext>
             </a:extLst>
           </p:cNvPr>
@@ -1613,7 +2062,7 @@
             <a:pPr lvl="0"/>
             <a:r>
               <a:rPr lang="en-US"/>
-              <a:t>Edit Master text styles</a:t>
+              <a:t>Click to edit Master text styles</a:t>
             </a:r>
           </a:p>
         </p:txBody>
@@ -1623,7 +2072,7 @@
           <p:cNvPr id="4" name="Content Placeholder 3">
             <a:extLst>
               <a:ext uri="{FF2B5EF4-FFF2-40B4-BE49-F238E27FC236}">
-                <a16:creationId xmlns:a16="http://schemas.microsoft.com/office/drawing/2014/main" id="{1EB4E44D-B997-4917-95E1-5AE518178E2E}"/>
+                <a16:creationId xmlns:a16="http://schemas.microsoft.com/office/drawing/2014/main" id="{09D25BED-3CFC-4159-AF8F-D972974F598C}"/>
               </a:ext>
             </a:extLst>
           </p:cNvPr>
@@ -1647,7 +2096,7 @@
             <a:pPr lvl="0"/>
             <a:r>
               <a:rPr lang="en-US"/>
-              <a:t>Edit Master text styles</a:t>
+              <a:t>Click to edit Master text styles</a:t>
             </a:r>
           </a:p>
           <a:p>
@@ -1686,7 +2135,7 @@
           <p:cNvPr id="5" name="Text Placeholder 4">
             <a:extLst>
               <a:ext uri="{FF2B5EF4-FFF2-40B4-BE49-F238E27FC236}">
-                <a16:creationId xmlns:a16="http://schemas.microsoft.com/office/drawing/2014/main" id="{98BFA53B-C182-4504-8D35-6DE248D838E3}"/>
+                <a16:creationId xmlns:a16="http://schemas.microsoft.com/office/drawing/2014/main" id="{B253EB5D-64EC-43AE-8AD6-455B7620B04F}"/>
               </a:ext>
             </a:extLst>
           </p:cNvPr>
@@ -1747,7 +2196,7 @@
             <a:pPr lvl="0"/>
             <a:r>
               <a:rPr lang="en-US"/>
-              <a:t>Edit Master text styles</a:t>
+              <a:t>Click to edit Master text styles</a:t>
             </a:r>
           </a:p>
         </p:txBody>
@@ -1757,7 +2206,7 @@
           <p:cNvPr id="6" name="Content Placeholder 5">
             <a:extLst>
               <a:ext uri="{FF2B5EF4-FFF2-40B4-BE49-F238E27FC236}">
-                <a16:creationId xmlns:a16="http://schemas.microsoft.com/office/drawing/2014/main" id="{D1926607-A411-46D0-AEED-D77F2B5750AA}"/>
+                <a16:creationId xmlns:a16="http://schemas.microsoft.com/office/drawing/2014/main" id="{6998D1B7-7A1F-4C1A-AD8B-6C20DFEFB157}"/>
               </a:ext>
             </a:extLst>
           </p:cNvPr>
@@ -1781,7 +2230,7 @@
             <a:pPr lvl="0"/>
             <a:r>
               <a:rPr lang="en-US"/>
-              <a:t>Edit Master text styles</a:t>
+              <a:t>Click to edit Master text styles</a:t>
             </a:r>
           </a:p>
           <a:p>
@@ -1820,7 +2269,7 @@
           <p:cNvPr id="7" name="Date Placeholder 6">
             <a:extLst>
               <a:ext uri="{FF2B5EF4-FFF2-40B4-BE49-F238E27FC236}">
-                <a16:creationId xmlns:a16="http://schemas.microsoft.com/office/drawing/2014/main" id="{4C1FF4D4-2F24-4C2E-9528-6466C592E77D}"/>
+                <a16:creationId xmlns:a16="http://schemas.microsoft.com/office/drawing/2014/main" id="{4E76EC4C-8193-4742-97EB-94DA57E96907}"/>
               </a:ext>
             </a:extLst>
           </p:cNvPr>
@@ -1836,9 +2285,9 @@
           <a:bodyPr/>
           <a:lstStyle/>
           <a:p>
-            <a:fld id="{CA3F6D65-D313-4FE3-9FC2-6EE31A8B66DB}" type="datetimeFigureOut">
+            <a:fld id="{CDD6DE72-0FFC-4B3C-9BEB-F665F701F1AA}" type="datetimeFigureOut">
               <a:rPr lang="en-IN" smtClean="0"/>
-              <a:t>07-09-2019</a:t>
+              <a:t>12-01-2020</a:t>
             </a:fld>
             <a:endParaRPr lang="en-IN"/>
           </a:p>
@@ -1849,7 +2298,7 @@
           <p:cNvPr id="8" name="Footer Placeholder 7">
             <a:extLst>
               <a:ext uri="{FF2B5EF4-FFF2-40B4-BE49-F238E27FC236}">
-                <a16:creationId xmlns:a16="http://schemas.microsoft.com/office/drawing/2014/main" id="{0BAB741D-A1B2-4556-93B7-B2450C8B82D4}"/>
+                <a16:creationId xmlns:a16="http://schemas.microsoft.com/office/drawing/2014/main" id="{A6AC2098-B580-4F5E-B739-450B4CC0B6F8}"/>
               </a:ext>
             </a:extLst>
           </p:cNvPr>
@@ -1874,7 +2323,7 @@
           <p:cNvPr id="9" name="Slide Number Placeholder 8">
             <a:extLst>
               <a:ext uri="{FF2B5EF4-FFF2-40B4-BE49-F238E27FC236}">
-                <a16:creationId xmlns:a16="http://schemas.microsoft.com/office/drawing/2014/main" id="{7FADC632-DB04-4411-83AC-19CD97967A79}"/>
+                <a16:creationId xmlns:a16="http://schemas.microsoft.com/office/drawing/2014/main" id="{EB00E9B2-1952-4820-B23D-73355428A7A9}"/>
               </a:ext>
             </a:extLst>
           </p:cNvPr>
@@ -1890,7 +2339,7 @@
           <a:bodyPr/>
           <a:lstStyle/>
           <a:p>
-            <a:fld id="{D9C21DE9-720D-4D94-9868-9756A43D1FF2}" type="slidenum">
+            <a:fld id="{8753B5A3-119B-4152-BC9A-B6AE5BEF1782}" type="slidenum">
               <a:rPr lang="en-IN" smtClean="0"/>
               <a:t>‹#›</a:t>
             </a:fld>
@@ -1901,7 +2350,7 @@
     </p:spTree>
     <p:extLst>
       <p:ext uri="{BB962C8B-B14F-4D97-AF65-F5344CB8AC3E}">
-        <p14:creationId xmlns:p14="http://schemas.microsoft.com/office/powerpoint/2010/main" val="4284548605"/>
+        <p14:creationId xmlns:p14="http://schemas.microsoft.com/office/powerpoint/2010/main" val="1957934759"/>
       </p:ext>
     </p:extLst>
   </p:cSld>
@@ -1933,7 +2382,7 @@
           <p:cNvPr id="2" name="Title 1">
             <a:extLst>
               <a:ext uri="{FF2B5EF4-FFF2-40B4-BE49-F238E27FC236}">
-                <a16:creationId xmlns:a16="http://schemas.microsoft.com/office/drawing/2014/main" id="{91F72610-FB8F-4F3A-B375-45E6AEC0D948}"/>
+                <a16:creationId xmlns:a16="http://schemas.microsoft.com/office/drawing/2014/main" id="{50FF080B-07F0-4CC4-8F52-CFB56F3A18A7}"/>
               </a:ext>
             </a:extLst>
           </p:cNvPr>
@@ -1962,7 +2411,7 @@
           <p:cNvPr id="3" name="Date Placeholder 2">
             <a:extLst>
               <a:ext uri="{FF2B5EF4-FFF2-40B4-BE49-F238E27FC236}">
-                <a16:creationId xmlns:a16="http://schemas.microsoft.com/office/drawing/2014/main" id="{C4E8A356-6F6C-4B08-9987-283EB0A839BC}"/>
+                <a16:creationId xmlns:a16="http://schemas.microsoft.com/office/drawing/2014/main" id="{BA604202-683C-42A3-860D-9677BD0FF169}"/>
               </a:ext>
             </a:extLst>
           </p:cNvPr>
@@ -1978,9 +2427,9 @@
           <a:bodyPr/>
           <a:lstStyle/>
           <a:p>
-            <a:fld id="{CA3F6D65-D313-4FE3-9FC2-6EE31A8B66DB}" type="datetimeFigureOut">
+            <a:fld id="{CDD6DE72-0FFC-4B3C-9BEB-F665F701F1AA}" type="datetimeFigureOut">
               <a:rPr lang="en-IN" smtClean="0"/>
-              <a:t>07-09-2019</a:t>
+              <a:t>12-01-2020</a:t>
             </a:fld>
             <a:endParaRPr lang="en-IN"/>
           </a:p>
@@ -1991,7 +2440,7 @@
           <p:cNvPr id="4" name="Footer Placeholder 3">
             <a:extLst>
               <a:ext uri="{FF2B5EF4-FFF2-40B4-BE49-F238E27FC236}">
-                <a16:creationId xmlns:a16="http://schemas.microsoft.com/office/drawing/2014/main" id="{5742363D-5335-46D8-B46B-9F2A3C34881F}"/>
+                <a16:creationId xmlns:a16="http://schemas.microsoft.com/office/drawing/2014/main" id="{49DF8178-FB52-4405-9252-4FC1C64C041D}"/>
               </a:ext>
             </a:extLst>
           </p:cNvPr>
@@ -2016,7 +2465,7 @@
           <p:cNvPr id="5" name="Slide Number Placeholder 4">
             <a:extLst>
               <a:ext uri="{FF2B5EF4-FFF2-40B4-BE49-F238E27FC236}">
-                <a16:creationId xmlns:a16="http://schemas.microsoft.com/office/drawing/2014/main" id="{F9BAA86D-7ADF-4450-8287-D15003AF6DEB}"/>
+                <a16:creationId xmlns:a16="http://schemas.microsoft.com/office/drawing/2014/main" id="{8439011F-ED91-49EA-808E-B795D93BE8FF}"/>
               </a:ext>
             </a:extLst>
           </p:cNvPr>
@@ -2032,7 +2481,7 @@
           <a:bodyPr/>
           <a:lstStyle/>
           <a:p>
-            <a:fld id="{D9C21DE9-720D-4D94-9868-9756A43D1FF2}" type="slidenum">
+            <a:fld id="{8753B5A3-119B-4152-BC9A-B6AE5BEF1782}" type="slidenum">
               <a:rPr lang="en-IN" smtClean="0"/>
               <a:t>‹#›</a:t>
             </a:fld>
@@ -2043,7 +2492,7 @@
     </p:spTree>
     <p:extLst>
       <p:ext uri="{BB962C8B-B14F-4D97-AF65-F5344CB8AC3E}">
-        <p14:creationId xmlns:p14="http://schemas.microsoft.com/office/powerpoint/2010/main" val="3628507416"/>
+        <p14:creationId xmlns:p14="http://schemas.microsoft.com/office/powerpoint/2010/main" val="2534313839"/>
       </p:ext>
     </p:extLst>
   </p:cSld>
@@ -2075,7 +2524,7 @@
           <p:cNvPr id="2" name="Date Placeholder 1">
             <a:extLst>
               <a:ext uri="{FF2B5EF4-FFF2-40B4-BE49-F238E27FC236}">
-                <a16:creationId xmlns:a16="http://schemas.microsoft.com/office/drawing/2014/main" id="{2D2E51CC-B5DD-4EC8-8137-D23FE6CB9226}"/>
+                <a16:creationId xmlns:a16="http://schemas.microsoft.com/office/drawing/2014/main" id="{1E672DEE-FE6C-4C6E-9951-10BCE2F1CE1B}"/>
               </a:ext>
             </a:extLst>
           </p:cNvPr>
@@ -2091,9 +2540,9 @@
           <a:bodyPr/>
           <a:lstStyle/>
           <a:p>
-            <a:fld id="{CA3F6D65-D313-4FE3-9FC2-6EE31A8B66DB}" type="datetimeFigureOut">
+            <a:fld id="{CDD6DE72-0FFC-4B3C-9BEB-F665F701F1AA}" type="datetimeFigureOut">
               <a:rPr lang="en-IN" smtClean="0"/>
-              <a:t>07-09-2019</a:t>
+              <a:t>12-01-2020</a:t>
             </a:fld>
             <a:endParaRPr lang="en-IN"/>
           </a:p>
@@ -2104,7 +2553,7 @@
           <p:cNvPr id="3" name="Footer Placeholder 2">
             <a:extLst>
               <a:ext uri="{FF2B5EF4-FFF2-40B4-BE49-F238E27FC236}">
-                <a16:creationId xmlns:a16="http://schemas.microsoft.com/office/drawing/2014/main" id="{C66E44A1-D00F-403B-978C-3952FECE2207}"/>
+                <a16:creationId xmlns:a16="http://schemas.microsoft.com/office/drawing/2014/main" id="{9ADE6F29-52BF-4F15-9AE0-6373FC5792F6}"/>
               </a:ext>
             </a:extLst>
           </p:cNvPr>
@@ -2129,7 +2578,7 @@
           <p:cNvPr id="4" name="Slide Number Placeholder 3">
             <a:extLst>
               <a:ext uri="{FF2B5EF4-FFF2-40B4-BE49-F238E27FC236}">
-                <a16:creationId xmlns:a16="http://schemas.microsoft.com/office/drawing/2014/main" id="{7193ACBB-1683-459C-9891-E6D1A528CE02}"/>
+                <a16:creationId xmlns:a16="http://schemas.microsoft.com/office/drawing/2014/main" id="{897C7FDC-54A3-43FD-8739-46838F8DB64C}"/>
               </a:ext>
             </a:extLst>
           </p:cNvPr>
@@ -2145,7 +2594,7 @@
           <a:bodyPr/>
           <a:lstStyle/>
           <a:p>
-            <a:fld id="{D9C21DE9-720D-4D94-9868-9756A43D1FF2}" type="slidenum">
+            <a:fld id="{8753B5A3-119B-4152-BC9A-B6AE5BEF1782}" type="slidenum">
               <a:rPr lang="en-IN" smtClean="0"/>
               <a:t>‹#›</a:t>
             </a:fld>
@@ -2156,7 +2605,7 @@
     </p:spTree>
     <p:extLst>
       <p:ext uri="{BB962C8B-B14F-4D97-AF65-F5344CB8AC3E}">
-        <p14:creationId xmlns:p14="http://schemas.microsoft.com/office/powerpoint/2010/main" val="3509611894"/>
+        <p14:creationId xmlns:p14="http://schemas.microsoft.com/office/powerpoint/2010/main" val="691632097"/>
       </p:ext>
     </p:extLst>
   </p:cSld>
@@ -2188,7 +2637,7 @@
           <p:cNvPr id="2" name="Title 1">
             <a:extLst>
               <a:ext uri="{FF2B5EF4-FFF2-40B4-BE49-F238E27FC236}">
-                <a16:creationId xmlns:a16="http://schemas.microsoft.com/office/drawing/2014/main" id="{B75DB5F2-23F6-41D4-B271-462D4A3A1A32}"/>
+                <a16:creationId xmlns:a16="http://schemas.microsoft.com/office/drawing/2014/main" id="{B8E98D18-858E-418D-A0BD-0FE01ABBD8E0}"/>
               </a:ext>
             </a:extLst>
           </p:cNvPr>
@@ -2226,7 +2675,7 @@
           <p:cNvPr id="3" name="Content Placeholder 2">
             <a:extLst>
               <a:ext uri="{FF2B5EF4-FFF2-40B4-BE49-F238E27FC236}">
-                <a16:creationId xmlns:a16="http://schemas.microsoft.com/office/drawing/2014/main" id="{7CAD3F2A-B974-4E8C-AB86-B6CF078E90E1}"/>
+                <a16:creationId xmlns:a16="http://schemas.microsoft.com/office/drawing/2014/main" id="{CBC1492F-2A0E-4D0B-B8AD-83C5D8A54B38}"/>
               </a:ext>
             </a:extLst>
           </p:cNvPr>
@@ -2278,7 +2727,7 @@
             <a:pPr lvl="0"/>
             <a:r>
               <a:rPr lang="en-US"/>
-              <a:t>Edit Master text styles</a:t>
+              <a:t>Click to edit Master text styles</a:t>
             </a:r>
           </a:p>
           <a:p>
@@ -2317,7 +2766,7 @@
           <p:cNvPr id="4" name="Text Placeholder 3">
             <a:extLst>
               <a:ext uri="{FF2B5EF4-FFF2-40B4-BE49-F238E27FC236}">
-                <a16:creationId xmlns:a16="http://schemas.microsoft.com/office/drawing/2014/main" id="{9EA6F6F3-22AB-4D2D-BA44-460CC64A9928}"/>
+                <a16:creationId xmlns:a16="http://schemas.microsoft.com/office/drawing/2014/main" id="{EE7757C1-2C9B-444D-A484-E1327915E363}"/>
               </a:ext>
             </a:extLst>
           </p:cNvPr>
@@ -2378,7 +2827,7 @@
             <a:pPr lvl="0"/>
             <a:r>
               <a:rPr lang="en-US"/>
-              <a:t>Edit Master text styles</a:t>
+              <a:t>Click to edit Master text styles</a:t>
             </a:r>
           </a:p>
         </p:txBody>
@@ -2388,7 +2837,7 @@
           <p:cNvPr id="5" name="Date Placeholder 4">
             <a:extLst>
               <a:ext uri="{FF2B5EF4-FFF2-40B4-BE49-F238E27FC236}">
-                <a16:creationId xmlns:a16="http://schemas.microsoft.com/office/drawing/2014/main" id="{D832BFAF-509B-45EE-8473-2A1A19EE7930}"/>
+                <a16:creationId xmlns:a16="http://schemas.microsoft.com/office/drawing/2014/main" id="{C0F70D41-61DF-418E-92AD-0591EBEA22EC}"/>
               </a:ext>
             </a:extLst>
           </p:cNvPr>
@@ -2404,9 +2853,9 @@
           <a:bodyPr/>
           <a:lstStyle/>
           <a:p>
-            <a:fld id="{CA3F6D65-D313-4FE3-9FC2-6EE31A8B66DB}" type="datetimeFigureOut">
+            <a:fld id="{CDD6DE72-0FFC-4B3C-9BEB-F665F701F1AA}" type="datetimeFigureOut">
               <a:rPr lang="en-IN" smtClean="0"/>
-              <a:t>07-09-2019</a:t>
+              <a:t>12-01-2020</a:t>
             </a:fld>
             <a:endParaRPr lang="en-IN"/>
           </a:p>
@@ -2417,7 +2866,7 @@
           <p:cNvPr id="6" name="Footer Placeholder 5">
             <a:extLst>
               <a:ext uri="{FF2B5EF4-FFF2-40B4-BE49-F238E27FC236}">
-                <a16:creationId xmlns:a16="http://schemas.microsoft.com/office/drawing/2014/main" id="{E44F0E34-4C4F-4813-AA2C-14629E9A092C}"/>
+                <a16:creationId xmlns:a16="http://schemas.microsoft.com/office/drawing/2014/main" id="{C24D4D05-2FC0-4DB3-ABE8-56431CFB6056}"/>
               </a:ext>
             </a:extLst>
           </p:cNvPr>
@@ -2442,7 +2891,7 @@
           <p:cNvPr id="7" name="Slide Number Placeholder 6">
             <a:extLst>
               <a:ext uri="{FF2B5EF4-FFF2-40B4-BE49-F238E27FC236}">
-                <a16:creationId xmlns:a16="http://schemas.microsoft.com/office/drawing/2014/main" id="{32554E19-90AC-4FC1-A642-D7F9BDDC3081}"/>
+                <a16:creationId xmlns:a16="http://schemas.microsoft.com/office/drawing/2014/main" id="{5BA78942-A477-410D-A5E8-C448E7EEFE99}"/>
               </a:ext>
             </a:extLst>
           </p:cNvPr>
@@ -2458,7 +2907,7 @@
           <a:bodyPr/>
           <a:lstStyle/>
           <a:p>
-            <a:fld id="{D9C21DE9-720D-4D94-9868-9756A43D1FF2}" type="slidenum">
+            <a:fld id="{8753B5A3-119B-4152-BC9A-B6AE5BEF1782}" type="slidenum">
               <a:rPr lang="en-IN" smtClean="0"/>
               <a:t>‹#›</a:t>
             </a:fld>
@@ -2469,7 +2918,7 @@
     </p:spTree>
     <p:extLst>
       <p:ext uri="{BB962C8B-B14F-4D97-AF65-F5344CB8AC3E}">
-        <p14:creationId xmlns:p14="http://schemas.microsoft.com/office/powerpoint/2010/main" val="1334380591"/>
+        <p14:creationId xmlns:p14="http://schemas.microsoft.com/office/powerpoint/2010/main" val="386090070"/>
       </p:ext>
     </p:extLst>
   </p:cSld>
@@ -2501,7 +2950,7 @@
           <p:cNvPr id="2" name="Title 1">
             <a:extLst>
               <a:ext uri="{FF2B5EF4-FFF2-40B4-BE49-F238E27FC236}">
-                <a16:creationId xmlns:a16="http://schemas.microsoft.com/office/drawing/2014/main" id="{98354A06-34C4-49B7-8423-877DF409BE69}"/>
+                <a16:creationId xmlns:a16="http://schemas.microsoft.com/office/drawing/2014/main" id="{C0B593CE-65EC-4172-AA29-85D2B9162D8C}"/>
               </a:ext>
             </a:extLst>
           </p:cNvPr>
@@ -2539,7 +2988,7 @@
           <p:cNvPr id="3" name="Picture Placeholder 2">
             <a:extLst>
               <a:ext uri="{FF2B5EF4-FFF2-40B4-BE49-F238E27FC236}">
-                <a16:creationId xmlns:a16="http://schemas.microsoft.com/office/drawing/2014/main" id="{7FD458CA-A794-45DB-897F-A7EDCEA313AD}"/>
+                <a16:creationId xmlns:a16="http://schemas.microsoft.com/office/drawing/2014/main" id="{0EC9B4E2-6C23-42E9-9ED2-A2CAF1EDB7BF}"/>
               </a:ext>
             </a:extLst>
           </p:cNvPr>
@@ -2606,7 +3055,7 @@
           <p:cNvPr id="4" name="Text Placeholder 3">
             <a:extLst>
               <a:ext uri="{FF2B5EF4-FFF2-40B4-BE49-F238E27FC236}">
-                <a16:creationId xmlns:a16="http://schemas.microsoft.com/office/drawing/2014/main" id="{E42F243E-5545-491D-AFAC-815E7A630863}"/>
+                <a16:creationId xmlns:a16="http://schemas.microsoft.com/office/drawing/2014/main" id="{5A4D505C-86C3-4E3D-B296-F9B6569E3A8F}"/>
               </a:ext>
             </a:extLst>
           </p:cNvPr>
@@ -2667,7 +3116,7 @@
             <a:pPr lvl="0"/>
             <a:r>
               <a:rPr lang="en-US"/>
-              <a:t>Edit Master text styles</a:t>
+              <a:t>Click to edit Master text styles</a:t>
             </a:r>
           </a:p>
         </p:txBody>
@@ -2677,7 +3126,7 @@
           <p:cNvPr id="5" name="Date Placeholder 4">
             <a:extLst>
               <a:ext uri="{FF2B5EF4-FFF2-40B4-BE49-F238E27FC236}">
-                <a16:creationId xmlns:a16="http://schemas.microsoft.com/office/drawing/2014/main" id="{E947115A-9E9C-4FD2-B9AE-9EDB3BF696C8}"/>
+                <a16:creationId xmlns:a16="http://schemas.microsoft.com/office/drawing/2014/main" id="{8152E6CF-1F33-4463-B82D-2852C83B6665}"/>
               </a:ext>
             </a:extLst>
           </p:cNvPr>
@@ -2693,9 +3142,9 @@
           <a:bodyPr/>
           <a:lstStyle/>
           <a:p>
-            <a:fld id="{CA3F6D65-D313-4FE3-9FC2-6EE31A8B66DB}" type="datetimeFigureOut">
+            <a:fld id="{CDD6DE72-0FFC-4B3C-9BEB-F665F701F1AA}" type="datetimeFigureOut">
               <a:rPr lang="en-IN" smtClean="0"/>
-              <a:t>07-09-2019</a:t>
+              <a:t>12-01-2020</a:t>
             </a:fld>
             <a:endParaRPr lang="en-IN"/>
           </a:p>
@@ -2706,7 +3155,7 @@
           <p:cNvPr id="6" name="Footer Placeholder 5">
             <a:extLst>
               <a:ext uri="{FF2B5EF4-FFF2-40B4-BE49-F238E27FC236}">
-                <a16:creationId xmlns:a16="http://schemas.microsoft.com/office/drawing/2014/main" id="{8CBC5B92-5149-41B0-8C98-047D2F05F56E}"/>
+                <a16:creationId xmlns:a16="http://schemas.microsoft.com/office/drawing/2014/main" id="{02744660-6260-4845-85AA-EF98B1F94A19}"/>
               </a:ext>
             </a:extLst>
           </p:cNvPr>
@@ -2731,7 +3180,7 @@
           <p:cNvPr id="7" name="Slide Number Placeholder 6">
             <a:extLst>
               <a:ext uri="{FF2B5EF4-FFF2-40B4-BE49-F238E27FC236}">
-                <a16:creationId xmlns:a16="http://schemas.microsoft.com/office/drawing/2014/main" id="{0F51048B-EDF3-4101-A1B9-DD87E21ECD91}"/>
+                <a16:creationId xmlns:a16="http://schemas.microsoft.com/office/drawing/2014/main" id="{6958AC96-9CEA-4E7A-9D7A-0DB78F72B850}"/>
               </a:ext>
             </a:extLst>
           </p:cNvPr>
@@ -2747,7 +3196,7 @@
           <a:bodyPr/>
           <a:lstStyle/>
           <a:p>
-            <a:fld id="{D9C21DE9-720D-4D94-9868-9756A43D1FF2}" type="slidenum">
+            <a:fld id="{8753B5A3-119B-4152-BC9A-B6AE5BEF1782}" type="slidenum">
               <a:rPr lang="en-IN" smtClean="0"/>
               <a:t>‹#›</a:t>
             </a:fld>
@@ -2758,7 +3207,7 @@
     </p:spTree>
     <p:extLst>
       <p:ext uri="{BB962C8B-B14F-4D97-AF65-F5344CB8AC3E}">
-        <p14:creationId xmlns:p14="http://schemas.microsoft.com/office/powerpoint/2010/main" val="686736919"/>
+        <p14:creationId xmlns:p14="http://schemas.microsoft.com/office/powerpoint/2010/main" val="4065585617"/>
       </p:ext>
     </p:extLst>
   </p:cSld>
@@ -2795,7 +3244,7 @@
           <p:cNvPr id="2" name="Title Placeholder 1">
             <a:extLst>
               <a:ext uri="{FF2B5EF4-FFF2-40B4-BE49-F238E27FC236}">
-                <a16:creationId xmlns:a16="http://schemas.microsoft.com/office/drawing/2014/main" id="{F3C16E9F-99C0-478D-A504-C48AD93C9121}"/>
+                <a16:creationId xmlns:a16="http://schemas.microsoft.com/office/drawing/2014/main" id="{9C37484D-544B-4502-9450-21CD30407BC9}"/>
               </a:ext>
             </a:extLst>
           </p:cNvPr>
@@ -2834,7 +3283,7 @@
           <p:cNvPr id="3" name="Text Placeholder 2">
             <a:extLst>
               <a:ext uri="{FF2B5EF4-FFF2-40B4-BE49-F238E27FC236}">
-                <a16:creationId xmlns:a16="http://schemas.microsoft.com/office/drawing/2014/main" id="{D16C5C15-1995-47A5-802E-410E1ECB761E}"/>
+                <a16:creationId xmlns:a16="http://schemas.microsoft.com/office/drawing/2014/main" id="{1AB614B6-DC70-45A4-946C-A809B756D894}"/>
               </a:ext>
             </a:extLst>
           </p:cNvPr>
@@ -2863,7 +3312,7 @@
             <a:pPr lvl="0"/>
             <a:r>
               <a:rPr lang="en-US"/>
-              <a:t>Edit Master text styles</a:t>
+              <a:t>Click to edit Master text styles</a:t>
             </a:r>
           </a:p>
           <a:p>
@@ -2902,7 +3351,7 @@
           <p:cNvPr id="4" name="Date Placeholder 3">
             <a:extLst>
               <a:ext uri="{FF2B5EF4-FFF2-40B4-BE49-F238E27FC236}">
-                <a16:creationId xmlns:a16="http://schemas.microsoft.com/office/drawing/2014/main" id="{2267B59D-53FE-4DE0-B17D-410DEA3856BF}"/>
+                <a16:creationId xmlns:a16="http://schemas.microsoft.com/office/drawing/2014/main" id="{D3669A4C-1AB9-4DF4-A915-22B79EEC7CCD}"/>
               </a:ext>
             </a:extLst>
           </p:cNvPr>
@@ -2936,9 +3385,9 @@
             </a:lvl1pPr>
           </a:lstStyle>
           <a:p>
-            <a:fld id="{CA3F6D65-D313-4FE3-9FC2-6EE31A8B66DB}" type="datetimeFigureOut">
+            <a:fld id="{CDD6DE72-0FFC-4B3C-9BEB-F665F701F1AA}" type="datetimeFigureOut">
               <a:rPr lang="en-IN" smtClean="0"/>
-              <a:t>07-09-2019</a:t>
+              <a:t>12-01-2020</a:t>
             </a:fld>
             <a:endParaRPr lang="en-IN"/>
           </a:p>
@@ -2949,7 +3398,7 @@
           <p:cNvPr id="5" name="Footer Placeholder 4">
             <a:extLst>
               <a:ext uri="{FF2B5EF4-FFF2-40B4-BE49-F238E27FC236}">
-                <a16:creationId xmlns:a16="http://schemas.microsoft.com/office/drawing/2014/main" id="{E782C87A-A256-4284-8BAF-B6C058C7BA29}"/>
+                <a16:creationId xmlns:a16="http://schemas.microsoft.com/office/drawing/2014/main" id="{0468E544-2CA8-4E52-B520-287498A3C280}"/>
               </a:ext>
             </a:extLst>
           </p:cNvPr>
@@ -2992,7 +3441,7 @@
           <p:cNvPr id="6" name="Slide Number Placeholder 5">
             <a:extLst>
               <a:ext uri="{FF2B5EF4-FFF2-40B4-BE49-F238E27FC236}">
-                <a16:creationId xmlns:a16="http://schemas.microsoft.com/office/drawing/2014/main" id="{50CF3BF0-BEC7-40C0-8304-5BF05E67A3BE}"/>
+                <a16:creationId xmlns:a16="http://schemas.microsoft.com/office/drawing/2014/main" id="{15A6968E-1A11-4232-AC22-5704D88E8DEE}"/>
               </a:ext>
             </a:extLst>
           </p:cNvPr>
@@ -3026,7 +3475,7 @@
             </a:lvl1pPr>
           </a:lstStyle>
           <a:p>
-            <a:fld id="{D9C21DE9-720D-4D94-9868-9756A43D1FF2}" type="slidenum">
+            <a:fld id="{8753B5A3-119B-4152-BC9A-B6AE5BEF1782}" type="slidenum">
               <a:rPr lang="en-IN" smtClean="0"/>
               <a:t>‹#›</a:t>
             </a:fld>
@@ -3037,7 +3486,7 @@
     </p:spTree>
     <p:extLst>
       <p:ext uri="{BB962C8B-B14F-4D97-AF65-F5344CB8AC3E}">
-        <p14:creationId xmlns:p14="http://schemas.microsoft.com/office/powerpoint/2010/main" val="3604721991"/>
+        <p14:creationId xmlns:p14="http://schemas.microsoft.com/office/powerpoint/2010/main" val="2089469452"/>
       </p:ext>
     </p:extLst>
   </p:cSld>
@@ -3357,10 +3806,40 @@
       </p:grpSpPr>
       <p:sp>
         <p:nvSpPr>
+          <p:cNvPr id="2" name="Title 1">
+            <a:extLst>
+              <a:ext uri="{FF2B5EF4-FFF2-40B4-BE49-F238E27FC236}">
+                <a16:creationId xmlns:a16="http://schemas.microsoft.com/office/drawing/2014/main" id="{BCF02DA5-392D-416F-B856-14F095EBA257}"/>
+              </a:ext>
+            </a:extLst>
+          </p:cNvPr>
+          <p:cNvSpPr>
+            <a:spLocks noGrp="1"/>
+          </p:cNvSpPr>
+          <p:nvPr>
+            <p:ph type="ctrTitle"/>
+          </p:nvPr>
+        </p:nvSpPr>
+        <p:spPr/>
+        <p:txBody>
+          <a:bodyPr/>
+          <a:lstStyle/>
+          <a:p>
+            <a:pPr algn="r"/>
+            <a:r>
+              <a:rPr lang="en-US" dirty="0"/>
+              <a:t>Flask</a:t>
+            </a:r>
+            <a:endParaRPr lang="en-IN" dirty="0"/>
+          </a:p>
+        </p:txBody>
+      </p:sp>
+      <p:sp>
+        <p:nvSpPr>
           <p:cNvPr id="3" name="Subtitle 2">
             <a:extLst>
               <a:ext uri="{FF2B5EF4-FFF2-40B4-BE49-F238E27FC236}">
-                <a16:creationId xmlns:a16="http://schemas.microsoft.com/office/drawing/2014/main" id="{94813FFC-81CA-4FF6-B09E-7B70CEFD4DED}"/>
+                <a16:creationId xmlns:a16="http://schemas.microsoft.com/office/drawing/2014/main" id="{F70D4438-BD22-4BF3-83B0-85B7FCEFD24E}"/>
               </a:ext>
             </a:extLst>
           </p:cNvPr>
@@ -3371,19 +3850,15 @@
             <p:ph type="subTitle" idx="1"/>
           </p:nvPr>
         </p:nvSpPr>
-        <p:spPr>
-          <a:xfrm>
-            <a:off x="4965895" y="3156438"/>
-            <a:ext cx="2260209" cy="545123"/>
-          </a:xfrm>
-        </p:spPr>
-        <p:txBody>
-          <a:bodyPr/>
-          <a:lstStyle/>
-          <a:p>
+        <p:spPr/>
+        <p:txBody>
+          <a:bodyPr/>
+          <a:lstStyle/>
+          <a:p>
+            <a:pPr algn="r"/>
             <a:r>
               <a:rPr lang="en-US" dirty="0"/>
-              <a:t>Utkarsh Mehta</a:t>
+              <a:t>A python based lightweight web framework</a:t>
             </a:r>
             <a:endParaRPr lang="en-IN" dirty="0"/>
           </a:p>
@@ -3392,7 +3867,1142 @@
     </p:spTree>
     <p:extLst>
       <p:ext uri="{BB962C8B-B14F-4D97-AF65-F5344CB8AC3E}">
-        <p14:creationId xmlns:p14="http://schemas.microsoft.com/office/powerpoint/2010/main" val="1582732230"/>
+        <p14:creationId xmlns:p14="http://schemas.microsoft.com/office/powerpoint/2010/main" val="2754371462"/>
+      </p:ext>
+    </p:extLst>
+  </p:cSld>
+  <p:clrMapOvr>
+    <a:masterClrMapping/>
+  </p:clrMapOvr>
+</p:sld>
+</file>
+
+<file path=ppt/slides/slide10.xml><?xml version="1.0" encoding="utf-8"?>
+<p:sld xmlns:a="http://schemas.openxmlformats.org/drawingml/2006/main" xmlns:r="http://schemas.openxmlformats.org/officeDocument/2006/relationships" xmlns:p="http://schemas.openxmlformats.org/presentationml/2006/main">
+  <p:cSld>
+    <p:spTree>
+      <p:nvGrpSpPr>
+        <p:cNvPr id="1" name=""/>
+        <p:cNvGrpSpPr/>
+        <p:nvPr/>
+      </p:nvGrpSpPr>
+      <p:grpSpPr>
+        <a:xfrm>
+          <a:off x="0" y="0"/>
+          <a:ext cx="0" cy="0"/>
+          <a:chOff x="0" y="0"/>
+          <a:chExt cx="0" cy="0"/>
+        </a:xfrm>
+      </p:grpSpPr>
+      <p:sp>
+        <p:nvSpPr>
+          <p:cNvPr id="2" name="Title 1">
+            <a:extLst>
+              <a:ext uri="{FF2B5EF4-FFF2-40B4-BE49-F238E27FC236}">
+                <a16:creationId xmlns:a16="http://schemas.microsoft.com/office/drawing/2014/main" id="{29602F6E-C5BC-44E0-815D-83660617E87E}"/>
+              </a:ext>
+            </a:extLst>
+          </p:cNvPr>
+          <p:cNvSpPr>
+            <a:spLocks noGrp="1"/>
+          </p:cNvSpPr>
+          <p:nvPr>
+            <p:ph type="title"/>
+          </p:nvPr>
+        </p:nvSpPr>
+        <p:spPr/>
+        <p:txBody>
+          <a:bodyPr/>
+          <a:lstStyle/>
+          <a:p>
+            <a:r>
+              <a:rPr lang="en-US" dirty="0"/>
+              <a:t>Routes</a:t>
+            </a:r>
+            <a:endParaRPr lang="en-IN" dirty="0"/>
+          </a:p>
+        </p:txBody>
+      </p:sp>
+      <p:pic>
+        <p:nvPicPr>
+          <p:cNvPr id="4" name="Picture 3">
+            <a:extLst>
+              <a:ext uri="{FF2B5EF4-FFF2-40B4-BE49-F238E27FC236}">
+                <a16:creationId xmlns:a16="http://schemas.microsoft.com/office/drawing/2014/main" id="{E599F896-C5BA-4DCB-91EE-1A28D8ED8A20}"/>
+              </a:ext>
+            </a:extLst>
+          </p:cNvPr>
+          <p:cNvPicPr>
+            <a:picLocks noChangeAspect="1"/>
+          </p:cNvPicPr>
+          <p:nvPr/>
+        </p:nvPicPr>
+        <p:blipFill>
+          <a:blip r:embed="rId2"/>
+          <a:stretch>
+            <a:fillRect/>
+          </a:stretch>
+        </p:blipFill>
+        <p:spPr>
+          <a:xfrm>
+            <a:off x="838199" y="1690688"/>
+            <a:ext cx="9125751" cy="4802187"/>
+          </a:xfrm>
+          <a:prstGeom prst="rect">
+            <a:avLst/>
+          </a:prstGeom>
+        </p:spPr>
+      </p:pic>
+      <p:sp>
+        <p:nvSpPr>
+          <p:cNvPr id="3" name="Rectangle 2">
+            <a:extLst>
+              <a:ext uri="{FF2B5EF4-FFF2-40B4-BE49-F238E27FC236}">
+                <a16:creationId xmlns:a16="http://schemas.microsoft.com/office/drawing/2014/main" id="{D731C50F-6406-43C6-AED0-13A661D9FFC3}"/>
+              </a:ext>
+            </a:extLst>
+          </p:cNvPr>
+          <p:cNvSpPr/>
+          <p:nvPr/>
+        </p:nvSpPr>
+        <p:spPr>
+          <a:xfrm>
+            <a:off x="1540042" y="2582779"/>
+            <a:ext cx="5037221" cy="224589"/>
+          </a:xfrm>
+          <a:prstGeom prst="rect">
+            <a:avLst/>
+          </a:prstGeom>
+        </p:spPr>
+        <p:style>
+          <a:lnRef idx="2">
+            <a:schemeClr val="dk1">
+              <a:shade val="50000"/>
+            </a:schemeClr>
+          </a:lnRef>
+          <a:fillRef idx="1">
+            <a:schemeClr val="dk1"/>
+          </a:fillRef>
+          <a:effectRef idx="0">
+            <a:schemeClr val="dk1"/>
+          </a:effectRef>
+          <a:fontRef idx="minor">
+            <a:schemeClr val="lt1"/>
+          </a:fontRef>
+        </p:style>
+        <p:txBody>
+          <a:bodyPr rtlCol="0" anchor="ctr"/>
+          <a:lstStyle/>
+          <a:p>
+            <a:pPr algn="ctr"/>
+            <a:endParaRPr lang="en-IN"/>
+          </a:p>
+        </p:txBody>
+      </p:sp>
+      <p:sp>
+        <p:nvSpPr>
+          <p:cNvPr id="5" name="Rectangle 4">
+            <a:extLst>
+              <a:ext uri="{FF2B5EF4-FFF2-40B4-BE49-F238E27FC236}">
+                <a16:creationId xmlns:a16="http://schemas.microsoft.com/office/drawing/2014/main" id="{4671C488-5800-46F2-88E0-A5F79E68298B}"/>
+              </a:ext>
+            </a:extLst>
+          </p:cNvPr>
+          <p:cNvSpPr/>
+          <p:nvPr/>
+        </p:nvSpPr>
+        <p:spPr>
+          <a:xfrm>
+            <a:off x="1540042" y="4173036"/>
+            <a:ext cx="7427495" cy="224589"/>
+          </a:xfrm>
+          <a:prstGeom prst="rect">
+            <a:avLst/>
+          </a:prstGeom>
+        </p:spPr>
+        <p:style>
+          <a:lnRef idx="2">
+            <a:schemeClr val="dk1">
+              <a:shade val="50000"/>
+            </a:schemeClr>
+          </a:lnRef>
+          <a:fillRef idx="1">
+            <a:schemeClr val="dk1"/>
+          </a:fillRef>
+          <a:effectRef idx="0">
+            <a:schemeClr val="dk1"/>
+          </a:effectRef>
+          <a:fontRef idx="minor">
+            <a:schemeClr val="lt1"/>
+          </a:fontRef>
+        </p:style>
+        <p:txBody>
+          <a:bodyPr rtlCol="0" anchor="ctr"/>
+          <a:lstStyle/>
+          <a:p>
+            <a:pPr algn="ctr"/>
+            <a:endParaRPr lang="en-IN"/>
+          </a:p>
+        </p:txBody>
+      </p:sp>
+      <p:sp>
+        <p:nvSpPr>
+          <p:cNvPr id="6" name="Rectangle 5">
+            <a:extLst>
+              <a:ext uri="{FF2B5EF4-FFF2-40B4-BE49-F238E27FC236}">
+                <a16:creationId xmlns:a16="http://schemas.microsoft.com/office/drawing/2014/main" id="{FB265EE8-A8E3-4E03-ADC2-74A7A6F2C59B}"/>
+              </a:ext>
+            </a:extLst>
+          </p:cNvPr>
+          <p:cNvSpPr/>
+          <p:nvPr/>
+        </p:nvSpPr>
+        <p:spPr>
+          <a:xfrm>
+            <a:off x="1540041" y="5723188"/>
+            <a:ext cx="4219075" cy="224589"/>
+          </a:xfrm>
+          <a:prstGeom prst="rect">
+            <a:avLst/>
+          </a:prstGeom>
+        </p:spPr>
+        <p:style>
+          <a:lnRef idx="2">
+            <a:schemeClr val="dk1">
+              <a:shade val="50000"/>
+            </a:schemeClr>
+          </a:lnRef>
+          <a:fillRef idx="1">
+            <a:schemeClr val="dk1"/>
+          </a:fillRef>
+          <a:effectRef idx="0">
+            <a:schemeClr val="dk1"/>
+          </a:effectRef>
+          <a:fontRef idx="minor">
+            <a:schemeClr val="lt1"/>
+          </a:fontRef>
+        </p:style>
+        <p:txBody>
+          <a:bodyPr rtlCol="0" anchor="ctr"/>
+          <a:lstStyle/>
+          <a:p>
+            <a:pPr algn="ctr"/>
+            <a:endParaRPr lang="en-IN"/>
+          </a:p>
+        </p:txBody>
+      </p:sp>
+    </p:spTree>
+    <p:extLst>
+      <p:ext uri="{BB962C8B-B14F-4D97-AF65-F5344CB8AC3E}">
+        <p14:creationId xmlns:p14="http://schemas.microsoft.com/office/powerpoint/2010/main" val="4240391100"/>
+      </p:ext>
+    </p:extLst>
+  </p:cSld>
+  <p:clrMapOvr>
+    <a:masterClrMapping/>
+  </p:clrMapOvr>
+</p:sld>
+</file>
+
+<file path=ppt/slides/slide11.xml><?xml version="1.0" encoding="utf-8"?>
+<p:sld xmlns:a="http://schemas.openxmlformats.org/drawingml/2006/main" xmlns:r="http://schemas.openxmlformats.org/officeDocument/2006/relationships" xmlns:p="http://schemas.openxmlformats.org/presentationml/2006/main">
+  <p:cSld>
+    <p:spTree>
+      <p:nvGrpSpPr>
+        <p:cNvPr id="1" name=""/>
+        <p:cNvGrpSpPr/>
+        <p:nvPr/>
+      </p:nvGrpSpPr>
+      <p:grpSpPr>
+        <a:xfrm>
+          <a:off x="0" y="0"/>
+          <a:ext cx="0" cy="0"/>
+          <a:chOff x="0" y="0"/>
+          <a:chExt cx="0" cy="0"/>
+        </a:xfrm>
+      </p:grpSpPr>
+      <p:sp>
+        <p:nvSpPr>
+          <p:cNvPr id="2" name="Title 1">
+            <a:extLst>
+              <a:ext uri="{FF2B5EF4-FFF2-40B4-BE49-F238E27FC236}">
+                <a16:creationId xmlns:a16="http://schemas.microsoft.com/office/drawing/2014/main" id="{EC862E65-7A4A-441E-9030-46AB5F83F119}"/>
+              </a:ext>
+            </a:extLst>
+          </p:cNvPr>
+          <p:cNvSpPr>
+            <a:spLocks noGrp="1"/>
+          </p:cNvSpPr>
+          <p:nvPr>
+            <p:ph type="title"/>
+          </p:nvPr>
+        </p:nvSpPr>
+        <p:spPr/>
+        <p:txBody>
+          <a:bodyPr/>
+          <a:lstStyle/>
+          <a:p>
+            <a:r>
+              <a:rPr lang="en-US" dirty="0"/>
+              <a:t>Routes – Converter Types</a:t>
+            </a:r>
+            <a:endParaRPr lang="en-IN" dirty="0"/>
+          </a:p>
+        </p:txBody>
+      </p:sp>
+      <p:pic>
+        <p:nvPicPr>
+          <p:cNvPr id="4" name="Picture 3">
+            <a:extLst>
+              <a:ext uri="{FF2B5EF4-FFF2-40B4-BE49-F238E27FC236}">
+                <a16:creationId xmlns:a16="http://schemas.microsoft.com/office/drawing/2014/main" id="{BF7093BB-D8C8-4BEA-9D97-9DBB41C31B78}"/>
+              </a:ext>
+            </a:extLst>
+          </p:cNvPr>
+          <p:cNvPicPr>
+            <a:picLocks noChangeAspect="1"/>
+          </p:cNvPicPr>
+          <p:nvPr/>
+        </p:nvPicPr>
+        <p:blipFill>
+          <a:blip r:embed="rId2"/>
+          <a:stretch>
+            <a:fillRect/>
+          </a:stretch>
+        </p:blipFill>
+        <p:spPr>
+          <a:xfrm>
+            <a:off x="838199" y="1771650"/>
+            <a:ext cx="10515599" cy="4528996"/>
+          </a:xfrm>
+          <a:prstGeom prst="rect">
+            <a:avLst/>
+          </a:prstGeom>
+        </p:spPr>
+      </p:pic>
+    </p:spTree>
+    <p:extLst>
+      <p:ext uri="{BB962C8B-B14F-4D97-AF65-F5344CB8AC3E}">
+        <p14:creationId xmlns:p14="http://schemas.microsoft.com/office/powerpoint/2010/main" val="2232066202"/>
+      </p:ext>
+    </p:extLst>
+  </p:cSld>
+  <p:clrMapOvr>
+    <a:masterClrMapping/>
+  </p:clrMapOvr>
+</p:sld>
+</file>
+
+<file path=ppt/slides/slide12.xml><?xml version="1.0" encoding="utf-8"?>
+<p:sld xmlns:a="http://schemas.openxmlformats.org/drawingml/2006/main" xmlns:r="http://schemas.openxmlformats.org/officeDocument/2006/relationships" xmlns:p="http://schemas.openxmlformats.org/presentationml/2006/main">
+  <p:cSld>
+    <p:spTree>
+      <p:nvGrpSpPr>
+        <p:cNvPr id="1" name=""/>
+        <p:cNvGrpSpPr/>
+        <p:nvPr/>
+      </p:nvGrpSpPr>
+      <p:grpSpPr>
+        <a:xfrm>
+          <a:off x="0" y="0"/>
+          <a:ext cx="0" cy="0"/>
+          <a:chOff x="0" y="0"/>
+          <a:chExt cx="0" cy="0"/>
+        </a:xfrm>
+      </p:grpSpPr>
+      <p:sp>
+        <p:nvSpPr>
+          <p:cNvPr id="2" name="Title 1">
+            <a:extLst>
+              <a:ext uri="{FF2B5EF4-FFF2-40B4-BE49-F238E27FC236}">
+                <a16:creationId xmlns:a16="http://schemas.microsoft.com/office/drawing/2014/main" id="{9B461200-C670-4A3B-B260-69440FFBF0E3}"/>
+              </a:ext>
+            </a:extLst>
+          </p:cNvPr>
+          <p:cNvSpPr>
+            <a:spLocks noGrp="1"/>
+          </p:cNvSpPr>
+          <p:nvPr>
+            <p:ph type="title"/>
+          </p:nvPr>
+        </p:nvSpPr>
+        <p:spPr/>
+        <p:txBody>
+          <a:bodyPr/>
+          <a:lstStyle/>
+          <a:p>
+            <a:r>
+              <a:rPr lang="en-US" dirty="0"/>
+              <a:t>API (Application Programming Interface)</a:t>
+            </a:r>
+            <a:endParaRPr lang="en-IN" dirty="0"/>
+          </a:p>
+        </p:txBody>
+      </p:sp>
+      <p:sp>
+        <p:nvSpPr>
+          <p:cNvPr id="3" name="Content Placeholder 2">
+            <a:extLst>
+              <a:ext uri="{FF2B5EF4-FFF2-40B4-BE49-F238E27FC236}">
+                <a16:creationId xmlns:a16="http://schemas.microsoft.com/office/drawing/2014/main" id="{4E067D12-1BF8-45D6-81CD-C4A81F60FDF6}"/>
+              </a:ext>
+            </a:extLst>
+          </p:cNvPr>
+          <p:cNvSpPr>
+            <a:spLocks noGrp="1"/>
+          </p:cNvSpPr>
+          <p:nvPr>
+            <p:ph idx="1"/>
+          </p:nvPr>
+        </p:nvSpPr>
+        <p:spPr/>
+        <p:txBody>
+          <a:bodyPr/>
+          <a:lstStyle/>
+          <a:p>
+            <a:r>
+              <a:rPr lang="en-US" dirty="0"/>
+              <a:t>An API is a set of rules that allow programs to talk to each other.</a:t>
+            </a:r>
+          </a:p>
+          <a:p>
+            <a:r>
+              <a:rPr lang="en-US" dirty="0"/>
+              <a:t>The waiter analogy:</a:t>
+            </a:r>
+          </a:p>
+          <a:p>
+            <a:pPr lvl="1"/>
+            <a:r>
+              <a:rPr lang="en-US" dirty="0"/>
+              <a:t>You talk in one language. (</a:t>
+            </a:r>
+            <a:r>
+              <a:rPr lang="en-US" dirty="0">
+                <a:hlinkClick r:id="rId2" action="ppaction://hlinksldjump"/>
+              </a:rPr>
+              <a:t>request</a:t>
+            </a:r>
+            <a:r>
+              <a:rPr lang="en-US" dirty="0"/>
+              <a:t>)</a:t>
+            </a:r>
+          </a:p>
+          <a:p>
+            <a:pPr lvl="1"/>
+            <a:r>
+              <a:rPr lang="en-US" dirty="0"/>
+              <a:t>The chef talks in another. (</a:t>
+            </a:r>
+            <a:r>
+              <a:rPr lang="en-US" dirty="0">
+                <a:hlinkClick r:id="rId3" action="ppaction://hlinksldjump"/>
+              </a:rPr>
+              <a:t>response</a:t>
+            </a:r>
+            <a:r>
+              <a:rPr lang="en-US" dirty="0"/>
+              <a:t>)</a:t>
+            </a:r>
+          </a:p>
+          <a:p>
+            <a:pPr lvl="1"/>
+            <a:r>
+              <a:rPr lang="en-US" dirty="0"/>
+              <a:t>Who is the mediator?</a:t>
+            </a:r>
+          </a:p>
+        </p:txBody>
+      </p:sp>
+    </p:spTree>
+    <p:extLst>
+      <p:ext uri="{BB962C8B-B14F-4D97-AF65-F5344CB8AC3E}">
+        <p14:creationId xmlns:p14="http://schemas.microsoft.com/office/powerpoint/2010/main" val="339321574"/>
+      </p:ext>
+    </p:extLst>
+  </p:cSld>
+  <p:clrMapOvr>
+    <a:masterClrMapping/>
+  </p:clrMapOvr>
+</p:sld>
+</file>
+
+<file path=ppt/slides/slide13.xml><?xml version="1.0" encoding="utf-8"?>
+<p:sld xmlns:a="http://schemas.openxmlformats.org/drawingml/2006/main" xmlns:r="http://schemas.openxmlformats.org/officeDocument/2006/relationships" xmlns:p="http://schemas.openxmlformats.org/presentationml/2006/main">
+  <p:cSld>
+    <p:spTree>
+      <p:nvGrpSpPr>
+        <p:cNvPr id="1" name=""/>
+        <p:cNvGrpSpPr/>
+        <p:nvPr/>
+      </p:nvGrpSpPr>
+      <p:grpSpPr>
+        <a:xfrm>
+          <a:off x="0" y="0"/>
+          <a:ext cx="0" cy="0"/>
+          <a:chOff x="0" y="0"/>
+          <a:chExt cx="0" cy="0"/>
+        </a:xfrm>
+      </p:grpSpPr>
+      <p:sp>
+        <p:nvSpPr>
+          <p:cNvPr id="2" name="Title 1">
+            <a:extLst>
+              <a:ext uri="{FF2B5EF4-FFF2-40B4-BE49-F238E27FC236}">
+                <a16:creationId xmlns:a16="http://schemas.microsoft.com/office/drawing/2014/main" id="{29AD2813-C198-4C87-B05B-16936F59FF14}"/>
+              </a:ext>
+            </a:extLst>
+          </p:cNvPr>
+          <p:cNvSpPr>
+            <a:spLocks noGrp="1"/>
+          </p:cNvSpPr>
+          <p:nvPr>
+            <p:ph type="title"/>
+          </p:nvPr>
+        </p:nvSpPr>
+        <p:spPr/>
+        <p:txBody>
+          <a:bodyPr/>
+          <a:lstStyle/>
+          <a:p>
+            <a:r>
+              <a:rPr lang="en-US" dirty="0"/>
+              <a:t>What is “REST” in REST API?</a:t>
+            </a:r>
+            <a:endParaRPr lang="en-IN" dirty="0"/>
+          </a:p>
+        </p:txBody>
+      </p:sp>
+      <p:sp>
+        <p:nvSpPr>
+          <p:cNvPr id="3" name="Content Placeholder 2">
+            <a:extLst>
+              <a:ext uri="{FF2B5EF4-FFF2-40B4-BE49-F238E27FC236}">
+                <a16:creationId xmlns:a16="http://schemas.microsoft.com/office/drawing/2014/main" id="{1D60E65E-F2EC-4F13-A943-A12C9C3BA026}"/>
+              </a:ext>
+            </a:extLst>
+          </p:cNvPr>
+          <p:cNvSpPr>
+            <a:spLocks noGrp="1"/>
+          </p:cNvSpPr>
+          <p:nvPr>
+            <p:ph idx="1"/>
+          </p:nvPr>
+        </p:nvSpPr>
+        <p:spPr/>
+        <p:txBody>
+          <a:bodyPr/>
+          <a:lstStyle/>
+          <a:p>
+            <a:r>
+              <a:rPr lang="en-US" dirty="0"/>
+              <a:t>REST is nothing but a set of principles that make APIs easier to make, understand, maintain and share.</a:t>
+            </a:r>
+          </a:p>
+          <a:p>
+            <a:r>
+              <a:rPr lang="en-US" dirty="0"/>
+              <a:t>You can read about these principles here.</a:t>
+            </a:r>
+          </a:p>
+          <a:p>
+            <a:r>
+              <a:rPr lang="en-IN" dirty="0">
+                <a:hlinkClick r:id="rId2"/>
+              </a:rPr>
+              <a:t>https://restfulapi.net/</a:t>
+            </a:r>
+            <a:endParaRPr lang="en-IN" dirty="0"/>
+          </a:p>
+        </p:txBody>
+      </p:sp>
+    </p:spTree>
+    <p:extLst>
+      <p:ext uri="{BB962C8B-B14F-4D97-AF65-F5344CB8AC3E}">
+        <p14:creationId xmlns:p14="http://schemas.microsoft.com/office/powerpoint/2010/main" val="2209497042"/>
+      </p:ext>
+    </p:extLst>
+  </p:cSld>
+  <p:clrMapOvr>
+    <a:masterClrMapping/>
+  </p:clrMapOvr>
+</p:sld>
+</file>
+
+<file path=ppt/slides/slide14.xml><?xml version="1.0" encoding="utf-8"?>
+<p:sld xmlns:a="http://schemas.openxmlformats.org/drawingml/2006/main" xmlns:r="http://schemas.openxmlformats.org/officeDocument/2006/relationships" xmlns:p="http://schemas.openxmlformats.org/presentationml/2006/main">
+  <p:cSld>
+    <p:spTree>
+      <p:nvGrpSpPr>
+        <p:cNvPr id="1" name=""/>
+        <p:cNvGrpSpPr/>
+        <p:nvPr/>
+      </p:nvGrpSpPr>
+      <p:grpSpPr>
+        <a:xfrm>
+          <a:off x="0" y="0"/>
+          <a:ext cx="0" cy="0"/>
+          <a:chOff x="0" y="0"/>
+          <a:chExt cx="0" cy="0"/>
+        </a:xfrm>
+      </p:grpSpPr>
+      <p:sp>
+        <p:nvSpPr>
+          <p:cNvPr id="2" name="Title 1">
+            <a:extLst>
+              <a:ext uri="{FF2B5EF4-FFF2-40B4-BE49-F238E27FC236}">
+                <a16:creationId xmlns:a16="http://schemas.microsoft.com/office/drawing/2014/main" id="{D48ADF1C-91D7-49F0-A4FC-9008D253CC35}"/>
+              </a:ext>
+            </a:extLst>
+          </p:cNvPr>
+          <p:cNvSpPr>
+            <a:spLocks noGrp="1"/>
+          </p:cNvSpPr>
+          <p:nvPr>
+            <p:ph type="title"/>
+          </p:nvPr>
+        </p:nvSpPr>
+        <p:spPr/>
+        <p:txBody>
+          <a:bodyPr/>
+          <a:lstStyle/>
+          <a:p>
+            <a:r>
+              <a:rPr lang="en-US" dirty="0"/>
+              <a:t>Things we can do with APIs</a:t>
+            </a:r>
+            <a:endParaRPr lang="en-IN" dirty="0"/>
+          </a:p>
+        </p:txBody>
+      </p:sp>
+      <p:pic>
+        <p:nvPicPr>
+          <p:cNvPr id="4" name="Picture 3">
+            <a:extLst>
+              <a:ext uri="{FF2B5EF4-FFF2-40B4-BE49-F238E27FC236}">
+                <a16:creationId xmlns:a16="http://schemas.microsoft.com/office/drawing/2014/main" id="{B147B6D8-CD48-4070-9245-EA690A17CD44}"/>
+              </a:ext>
+            </a:extLst>
+          </p:cNvPr>
+          <p:cNvPicPr>
+            <a:picLocks noChangeAspect="1"/>
+          </p:cNvPicPr>
+          <p:nvPr/>
+        </p:nvPicPr>
+        <p:blipFill>
+          <a:blip r:embed="rId2"/>
+          <a:stretch>
+            <a:fillRect/>
+          </a:stretch>
+        </p:blipFill>
+        <p:spPr>
+          <a:xfrm>
+            <a:off x="838200" y="1690688"/>
+            <a:ext cx="10515600" cy="5057230"/>
+          </a:xfrm>
+          <a:prstGeom prst="rect">
+            <a:avLst/>
+          </a:prstGeom>
+        </p:spPr>
+      </p:pic>
+    </p:spTree>
+    <p:extLst>
+      <p:ext uri="{BB962C8B-B14F-4D97-AF65-F5344CB8AC3E}">
+        <p14:creationId xmlns:p14="http://schemas.microsoft.com/office/powerpoint/2010/main" val="3372399507"/>
+      </p:ext>
+    </p:extLst>
+  </p:cSld>
+  <p:clrMapOvr>
+    <a:masterClrMapping/>
+  </p:clrMapOvr>
+</p:sld>
+</file>
+
+<file path=ppt/slides/slide15.xml><?xml version="1.0" encoding="utf-8"?>
+<p:sld xmlns:a="http://schemas.openxmlformats.org/drawingml/2006/main" xmlns:r="http://schemas.openxmlformats.org/officeDocument/2006/relationships" xmlns:p="http://schemas.openxmlformats.org/presentationml/2006/main">
+  <p:cSld>
+    <p:spTree>
+      <p:nvGrpSpPr>
+        <p:cNvPr id="1" name=""/>
+        <p:cNvGrpSpPr/>
+        <p:nvPr/>
+      </p:nvGrpSpPr>
+      <p:grpSpPr>
+        <a:xfrm>
+          <a:off x="0" y="0"/>
+          <a:ext cx="0" cy="0"/>
+          <a:chOff x="0" y="0"/>
+          <a:chExt cx="0" cy="0"/>
+        </a:xfrm>
+      </p:grpSpPr>
+      <p:sp>
+        <p:nvSpPr>
+          <p:cNvPr id="2" name="Title 1">
+            <a:extLst>
+              <a:ext uri="{FF2B5EF4-FFF2-40B4-BE49-F238E27FC236}">
+                <a16:creationId xmlns:a16="http://schemas.microsoft.com/office/drawing/2014/main" id="{C093EA1A-6522-4330-9AAA-602847FD3E09}"/>
+              </a:ext>
+            </a:extLst>
+          </p:cNvPr>
+          <p:cNvSpPr>
+            <a:spLocks noGrp="1"/>
+          </p:cNvSpPr>
+          <p:nvPr>
+            <p:ph type="title"/>
+          </p:nvPr>
+        </p:nvSpPr>
+        <p:spPr/>
+        <p:txBody>
+          <a:bodyPr/>
+          <a:lstStyle/>
+          <a:p>
+            <a:r>
+              <a:rPr lang="en-US" dirty="0"/>
+              <a:t>A bit about your request</a:t>
+            </a:r>
+            <a:endParaRPr lang="en-IN" dirty="0"/>
+          </a:p>
+        </p:txBody>
+      </p:sp>
+      <p:sp>
+        <p:nvSpPr>
+          <p:cNvPr id="3" name="Content Placeholder 2">
+            <a:extLst>
+              <a:ext uri="{FF2B5EF4-FFF2-40B4-BE49-F238E27FC236}">
+                <a16:creationId xmlns:a16="http://schemas.microsoft.com/office/drawing/2014/main" id="{E2606A6B-9C8A-4896-9855-1E016925A587}"/>
+              </a:ext>
+            </a:extLst>
+          </p:cNvPr>
+          <p:cNvSpPr>
+            <a:spLocks noGrp="1"/>
+          </p:cNvSpPr>
+          <p:nvPr>
+            <p:ph idx="1"/>
+          </p:nvPr>
+        </p:nvSpPr>
+        <p:spPr/>
+        <p:txBody>
+          <a:bodyPr/>
+          <a:lstStyle/>
+          <a:p>
+            <a:r>
+              <a:rPr lang="en-US" dirty="0"/>
+              <a:t>A request consists of the below parts:</a:t>
+            </a:r>
+          </a:p>
+          <a:p>
+            <a:endParaRPr lang="en-IN" dirty="0"/>
+          </a:p>
+        </p:txBody>
+      </p:sp>
+      <p:pic>
+        <p:nvPicPr>
+          <p:cNvPr id="4" name="Picture 3">
+            <a:extLst>
+              <a:ext uri="{FF2B5EF4-FFF2-40B4-BE49-F238E27FC236}">
+                <a16:creationId xmlns:a16="http://schemas.microsoft.com/office/drawing/2014/main" id="{24DAF293-F683-4D87-B93C-4DBE2A412E30}"/>
+              </a:ext>
+            </a:extLst>
+          </p:cNvPr>
+          <p:cNvPicPr>
+            <a:picLocks noChangeAspect="1"/>
+          </p:cNvPicPr>
+          <p:nvPr/>
+        </p:nvPicPr>
+        <p:blipFill>
+          <a:blip r:embed="rId2"/>
+          <a:stretch>
+            <a:fillRect/>
+          </a:stretch>
+        </p:blipFill>
+        <p:spPr>
+          <a:xfrm>
+            <a:off x="838200" y="2703388"/>
+            <a:ext cx="5257800" cy="3358084"/>
+          </a:xfrm>
+          <a:prstGeom prst="rect">
+            <a:avLst/>
+          </a:prstGeom>
+        </p:spPr>
+      </p:pic>
+    </p:spTree>
+    <p:extLst>
+      <p:ext uri="{BB962C8B-B14F-4D97-AF65-F5344CB8AC3E}">
+        <p14:creationId xmlns:p14="http://schemas.microsoft.com/office/powerpoint/2010/main" val="1970011675"/>
+      </p:ext>
+    </p:extLst>
+  </p:cSld>
+  <p:clrMapOvr>
+    <a:masterClrMapping/>
+  </p:clrMapOvr>
+</p:sld>
+</file>
+
+<file path=ppt/slides/slide16.xml><?xml version="1.0" encoding="utf-8"?>
+<p:sld xmlns:a="http://schemas.openxmlformats.org/drawingml/2006/main" xmlns:r="http://schemas.openxmlformats.org/officeDocument/2006/relationships" xmlns:p="http://schemas.openxmlformats.org/presentationml/2006/main">
+  <p:cSld>
+    <p:spTree>
+      <p:nvGrpSpPr>
+        <p:cNvPr id="1" name=""/>
+        <p:cNvGrpSpPr/>
+        <p:nvPr/>
+      </p:nvGrpSpPr>
+      <p:grpSpPr>
+        <a:xfrm>
+          <a:off x="0" y="0"/>
+          <a:ext cx="0" cy="0"/>
+          <a:chOff x="0" y="0"/>
+          <a:chExt cx="0" cy="0"/>
+        </a:xfrm>
+      </p:grpSpPr>
+      <p:sp>
+        <p:nvSpPr>
+          <p:cNvPr id="2" name="Title 1">
+            <a:extLst>
+              <a:ext uri="{FF2B5EF4-FFF2-40B4-BE49-F238E27FC236}">
+                <a16:creationId xmlns:a16="http://schemas.microsoft.com/office/drawing/2014/main" id="{F9671E8C-E120-4B26-81B7-DC71523855F5}"/>
+              </a:ext>
+            </a:extLst>
+          </p:cNvPr>
+          <p:cNvSpPr>
+            <a:spLocks noGrp="1"/>
+          </p:cNvSpPr>
+          <p:nvPr>
+            <p:ph type="title"/>
+          </p:nvPr>
+        </p:nvSpPr>
+        <p:spPr/>
+        <p:txBody>
+          <a:bodyPr/>
+          <a:lstStyle/>
+          <a:p>
+            <a:r>
+              <a:rPr lang="en-US" dirty="0"/>
+              <a:t>A bit about the response</a:t>
+            </a:r>
+            <a:endParaRPr lang="en-IN" dirty="0"/>
+          </a:p>
+        </p:txBody>
+      </p:sp>
+      <p:sp>
+        <p:nvSpPr>
+          <p:cNvPr id="3" name="Content Placeholder 2">
+            <a:extLst>
+              <a:ext uri="{FF2B5EF4-FFF2-40B4-BE49-F238E27FC236}">
+                <a16:creationId xmlns:a16="http://schemas.microsoft.com/office/drawing/2014/main" id="{D0BCC1AE-BAD5-48EA-8B32-5D97799F91EC}"/>
+              </a:ext>
+            </a:extLst>
+          </p:cNvPr>
+          <p:cNvSpPr>
+            <a:spLocks noGrp="1"/>
+          </p:cNvSpPr>
+          <p:nvPr>
+            <p:ph idx="1"/>
+          </p:nvPr>
+        </p:nvSpPr>
+        <p:spPr/>
+        <p:txBody>
+          <a:bodyPr/>
+          <a:lstStyle/>
+          <a:p>
+            <a:r>
+              <a:rPr lang="en-US" dirty="0"/>
+              <a:t>The response that you get from the server is:</a:t>
+            </a:r>
+          </a:p>
+          <a:p>
+            <a:endParaRPr lang="en-US" dirty="0"/>
+          </a:p>
+          <a:p>
+            <a:endParaRPr lang="en-US" dirty="0"/>
+          </a:p>
+          <a:p>
+            <a:endParaRPr lang="en-US" dirty="0"/>
+          </a:p>
+          <a:p>
+            <a:endParaRPr lang="en-US" dirty="0"/>
+          </a:p>
+          <a:p>
+            <a:endParaRPr lang="en-US" dirty="0"/>
+          </a:p>
+          <a:p>
+            <a:endParaRPr lang="en-US" dirty="0"/>
+          </a:p>
+          <a:p>
+            <a:r>
+              <a:rPr lang="en-US" dirty="0"/>
+              <a:t>Along with 200, you also get the requested data, obviously.</a:t>
+            </a:r>
+          </a:p>
+          <a:p>
+            <a:endParaRPr lang="en-IN" dirty="0"/>
+          </a:p>
+        </p:txBody>
+      </p:sp>
+      <p:pic>
+        <p:nvPicPr>
+          <p:cNvPr id="4" name="Picture 3">
+            <a:extLst>
+              <a:ext uri="{FF2B5EF4-FFF2-40B4-BE49-F238E27FC236}">
+                <a16:creationId xmlns:a16="http://schemas.microsoft.com/office/drawing/2014/main" id="{9BF65D5F-5930-4AC7-A65F-66939164E207}"/>
+              </a:ext>
+            </a:extLst>
+          </p:cNvPr>
+          <p:cNvPicPr>
+            <a:picLocks noChangeAspect="1"/>
+          </p:cNvPicPr>
+          <p:nvPr/>
+        </p:nvPicPr>
+        <p:blipFill>
+          <a:blip r:embed="rId2"/>
+          <a:stretch>
+            <a:fillRect/>
+          </a:stretch>
+        </p:blipFill>
+        <p:spPr>
+          <a:xfrm>
+            <a:off x="838200" y="2290762"/>
+            <a:ext cx="7010208" cy="3035217"/>
+          </a:xfrm>
+          <a:prstGeom prst="rect">
+            <a:avLst/>
+          </a:prstGeom>
+        </p:spPr>
+      </p:pic>
+    </p:spTree>
+    <p:extLst>
+      <p:ext uri="{BB962C8B-B14F-4D97-AF65-F5344CB8AC3E}">
+        <p14:creationId xmlns:p14="http://schemas.microsoft.com/office/powerpoint/2010/main" val="4174828100"/>
+      </p:ext>
+    </p:extLst>
+  </p:cSld>
+  <p:clrMapOvr>
+    <a:masterClrMapping/>
+  </p:clrMapOvr>
+</p:sld>
+</file>
+
+<file path=ppt/slides/slide17.xml><?xml version="1.0" encoding="utf-8"?>
+<p:sld xmlns:a="http://schemas.openxmlformats.org/drawingml/2006/main" xmlns:r="http://schemas.openxmlformats.org/officeDocument/2006/relationships" xmlns:p="http://schemas.openxmlformats.org/presentationml/2006/main">
+  <p:cSld>
+    <p:spTree>
+      <p:nvGrpSpPr>
+        <p:cNvPr id="1" name=""/>
+        <p:cNvGrpSpPr/>
+        <p:nvPr/>
+      </p:nvGrpSpPr>
+      <p:grpSpPr>
+        <a:xfrm>
+          <a:off x="0" y="0"/>
+          <a:ext cx="0" cy="0"/>
+          <a:chOff x="0" y="0"/>
+          <a:chExt cx="0" cy="0"/>
+        </a:xfrm>
+      </p:grpSpPr>
+      <p:sp>
+        <p:nvSpPr>
+          <p:cNvPr id="2" name="Title 1">
+            <a:extLst>
+              <a:ext uri="{FF2B5EF4-FFF2-40B4-BE49-F238E27FC236}">
+                <a16:creationId xmlns:a16="http://schemas.microsoft.com/office/drawing/2014/main" id="{3190AD6D-8483-4347-9C45-818B031C8DFE}"/>
+              </a:ext>
+            </a:extLst>
+          </p:cNvPr>
+          <p:cNvSpPr>
+            <a:spLocks noGrp="1"/>
+          </p:cNvSpPr>
+          <p:nvPr>
+            <p:ph type="title"/>
+          </p:nvPr>
+        </p:nvSpPr>
+        <p:spPr/>
+        <p:txBody>
+          <a:bodyPr/>
+          <a:lstStyle/>
+          <a:p>
+            <a:r>
+              <a:rPr lang="en-US" dirty="0"/>
+              <a:t>Coming back to our need.</a:t>
+            </a:r>
+            <a:endParaRPr lang="en-IN" dirty="0"/>
+          </a:p>
+        </p:txBody>
+      </p:sp>
+      <p:sp>
+        <p:nvSpPr>
+          <p:cNvPr id="3" name="Content Placeholder 2">
+            <a:extLst>
+              <a:ext uri="{FF2B5EF4-FFF2-40B4-BE49-F238E27FC236}">
+                <a16:creationId xmlns:a16="http://schemas.microsoft.com/office/drawing/2014/main" id="{57002CBD-6679-4AB9-B106-63A4CA0A3C45}"/>
+              </a:ext>
+            </a:extLst>
+          </p:cNvPr>
+          <p:cNvSpPr>
+            <a:spLocks noGrp="1"/>
+          </p:cNvSpPr>
+          <p:nvPr>
+            <p:ph idx="1"/>
+          </p:nvPr>
+        </p:nvSpPr>
+        <p:spPr/>
+        <p:txBody>
+          <a:bodyPr/>
+          <a:lstStyle/>
+          <a:p>
+            <a:r>
+              <a:rPr lang="en-US" dirty="0"/>
+              <a:t>What all APIs might we need?</a:t>
+            </a:r>
+          </a:p>
+          <a:p>
+            <a:r>
+              <a:rPr lang="en-US" dirty="0"/>
+              <a:t>What all tables might we need?</a:t>
+            </a:r>
+            <a:endParaRPr lang="en-IN" dirty="0"/>
+          </a:p>
+        </p:txBody>
+      </p:sp>
+    </p:spTree>
+    <p:extLst>
+      <p:ext uri="{BB962C8B-B14F-4D97-AF65-F5344CB8AC3E}">
+        <p14:creationId xmlns:p14="http://schemas.microsoft.com/office/powerpoint/2010/main" val="661454177"/>
+      </p:ext>
+    </p:extLst>
+  </p:cSld>
+  <p:clrMapOvr>
+    <a:masterClrMapping/>
+  </p:clrMapOvr>
+</p:sld>
+</file>
+
+<file path=ppt/slides/slide18.xml><?xml version="1.0" encoding="utf-8"?>
+<p:sld xmlns:a="http://schemas.openxmlformats.org/drawingml/2006/main" xmlns:r="http://schemas.openxmlformats.org/officeDocument/2006/relationships" xmlns:p="http://schemas.openxmlformats.org/presentationml/2006/main">
+  <p:cSld>
+    <p:spTree>
+      <p:nvGrpSpPr>
+        <p:cNvPr id="1" name=""/>
+        <p:cNvGrpSpPr/>
+        <p:nvPr/>
+      </p:nvGrpSpPr>
+      <p:grpSpPr>
+        <a:xfrm>
+          <a:off x="0" y="0"/>
+          <a:ext cx="0" cy="0"/>
+          <a:chOff x="0" y="0"/>
+          <a:chExt cx="0" cy="0"/>
+        </a:xfrm>
+      </p:grpSpPr>
+      <p:sp>
+        <p:nvSpPr>
+          <p:cNvPr id="2" name="Title 1">
+            <a:extLst>
+              <a:ext uri="{FF2B5EF4-FFF2-40B4-BE49-F238E27FC236}">
+                <a16:creationId xmlns:a16="http://schemas.microsoft.com/office/drawing/2014/main" id="{36DFDB79-904B-478C-BC28-0AC27FD02B53}"/>
+              </a:ext>
+            </a:extLst>
+          </p:cNvPr>
+          <p:cNvSpPr>
+            <a:spLocks noGrp="1"/>
+          </p:cNvSpPr>
+          <p:nvPr>
+            <p:ph type="title"/>
+          </p:nvPr>
+        </p:nvSpPr>
+        <p:spPr/>
+        <p:txBody>
+          <a:bodyPr/>
+          <a:lstStyle/>
+          <a:p>
+            <a:r>
+              <a:rPr lang="en-US" dirty="0"/>
+              <a:t>(some help that I took)</a:t>
+            </a:r>
+            <a:endParaRPr lang="en-IN" dirty="0"/>
+          </a:p>
+        </p:txBody>
+      </p:sp>
+      <p:sp>
+        <p:nvSpPr>
+          <p:cNvPr id="3" name="Content Placeholder 2">
+            <a:extLst>
+              <a:ext uri="{FF2B5EF4-FFF2-40B4-BE49-F238E27FC236}">
+                <a16:creationId xmlns:a16="http://schemas.microsoft.com/office/drawing/2014/main" id="{072ED3D5-9AED-4E2B-9EC7-404AC1B43B56}"/>
+              </a:ext>
+            </a:extLst>
+          </p:cNvPr>
+          <p:cNvSpPr>
+            <a:spLocks noGrp="1"/>
+          </p:cNvSpPr>
+          <p:nvPr>
+            <p:ph idx="1"/>
+          </p:nvPr>
+        </p:nvSpPr>
+        <p:spPr/>
+        <p:txBody>
+          <a:bodyPr/>
+          <a:lstStyle/>
+          <a:p>
+            <a:r>
+              <a:rPr lang="en-IN" dirty="0"/>
+              <a:t>What is REST? </a:t>
+            </a:r>
+            <a:r>
+              <a:rPr lang="en-IN" dirty="0">
+                <a:hlinkClick r:id="rId2"/>
+              </a:rPr>
+              <a:t>https://restfulapi.net/</a:t>
+            </a:r>
+            <a:endParaRPr lang="en-IN" dirty="0"/>
+          </a:p>
+          <a:p>
+            <a:r>
+              <a:rPr lang="en-IN" dirty="0"/>
+              <a:t>How to user REST APIs? </a:t>
+            </a:r>
+            <a:r>
+              <a:rPr lang="en-IN" dirty="0">
+                <a:hlinkClick r:id="rId3"/>
+              </a:rPr>
+              <a:t>https://www.smashingmagazine.com/2018/01/understanding-using-rest-api/</a:t>
+            </a:r>
+            <a:endParaRPr lang="en-IN" dirty="0"/>
+          </a:p>
+          <a:p>
+            <a:r>
+              <a:rPr lang="en-IN" dirty="0"/>
+              <a:t>Make RESTful APIs with Flask: </a:t>
+            </a:r>
+            <a:r>
+              <a:rPr lang="en-IN" dirty="0">
+                <a:hlinkClick r:id="rId4"/>
+              </a:rPr>
+              <a:t>https://blog.miguelgrinberg.com/post/designing-a-restful-api-with-python-and-flask</a:t>
+            </a:r>
+            <a:endParaRPr lang="en-IN" dirty="0"/>
+          </a:p>
+          <a:p>
+            <a:r>
+              <a:rPr lang="en-IN" dirty="0"/>
+              <a:t>Flask documentation: </a:t>
+            </a:r>
+            <a:r>
+              <a:rPr lang="en-IN" dirty="0">
+                <a:hlinkClick r:id="rId5"/>
+              </a:rPr>
+              <a:t>https://flask.palletsprojects.com/en/1.1.x/quickstart</a:t>
+            </a:r>
+            <a:endParaRPr lang="en-IN" dirty="0"/>
+          </a:p>
+          <a:p>
+            <a:endParaRPr lang="en-IN" dirty="0"/>
+          </a:p>
+        </p:txBody>
+      </p:sp>
+    </p:spTree>
+    <p:extLst>
+      <p:ext uri="{BB962C8B-B14F-4D97-AF65-F5344CB8AC3E}">
+        <p14:creationId xmlns:p14="http://schemas.microsoft.com/office/powerpoint/2010/main" val="3446997932"/>
       </p:ext>
     </p:extLst>
   </p:cSld>
@@ -3424,7 +5034,7 @@
           <p:cNvPr id="2" name="Title 1">
             <a:extLst>
               <a:ext uri="{FF2B5EF4-FFF2-40B4-BE49-F238E27FC236}">
-                <a16:creationId xmlns:a16="http://schemas.microsoft.com/office/drawing/2014/main" id="{257D92C8-D940-4D78-903A-9B93A9CBEE35}"/>
+                <a16:creationId xmlns:a16="http://schemas.microsoft.com/office/drawing/2014/main" id="{F9B3CE11-102F-4303-AE65-AFB104146891}"/>
               </a:ext>
             </a:extLst>
           </p:cNvPr>
@@ -3440,7 +5050,11 @@
           <a:bodyPr/>
           <a:lstStyle/>
           <a:p>
-            <a:endParaRPr lang="en-IN"/>
+            <a:r>
+              <a:rPr lang="en-US" dirty="0"/>
+              <a:t>What does it mean by ‘lightweight’?</a:t>
+            </a:r>
+            <a:endParaRPr lang="en-IN" dirty="0"/>
           </a:p>
         </p:txBody>
       </p:sp>
@@ -3449,7 +5063,7 @@
           <p:cNvPr id="3" name="Content Placeholder 2">
             <a:extLst>
               <a:ext uri="{FF2B5EF4-FFF2-40B4-BE49-F238E27FC236}">
-                <a16:creationId xmlns:a16="http://schemas.microsoft.com/office/drawing/2014/main" id="{4FC5D3C8-B39D-41FD-93C5-303E82FD4A90}"/>
+                <a16:creationId xmlns:a16="http://schemas.microsoft.com/office/drawing/2014/main" id="{3D6422FF-2BED-433E-8509-4ADF4E3F5359}"/>
               </a:ext>
             </a:extLst>
           </p:cNvPr>
@@ -3465,14 +5079,24 @@
           <a:bodyPr/>
           <a:lstStyle/>
           <a:p>
-            <a:endParaRPr lang="en-IN"/>
+            <a:r>
+              <a:rPr lang="en-US" dirty="0"/>
+              <a:t>Has nothing of its own.</a:t>
+            </a:r>
+          </a:p>
+          <a:p>
+            <a:r>
+              <a:rPr lang="en-US" dirty="0"/>
+              <a:t>Except for the framework, everything else is called using modules, libraries.</a:t>
+            </a:r>
+            <a:endParaRPr lang="en-IN" dirty="0"/>
           </a:p>
         </p:txBody>
       </p:sp>
     </p:spTree>
     <p:extLst>
       <p:ext uri="{BB962C8B-B14F-4D97-AF65-F5344CB8AC3E}">
-        <p14:creationId xmlns:p14="http://schemas.microsoft.com/office/powerpoint/2010/main" val="1058319367"/>
+        <p14:creationId xmlns:p14="http://schemas.microsoft.com/office/powerpoint/2010/main" val="1898562497"/>
       </p:ext>
     </p:extLst>
   </p:cSld>
@@ -3504,7 +5128,7 @@
           <p:cNvPr id="2" name="Title 1">
             <a:extLst>
               <a:ext uri="{FF2B5EF4-FFF2-40B4-BE49-F238E27FC236}">
-                <a16:creationId xmlns:a16="http://schemas.microsoft.com/office/drawing/2014/main" id="{86C21ABE-ED93-4ED2-B29A-98CBFE50C04E}"/>
+                <a16:creationId xmlns:a16="http://schemas.microsoft.com/office/drawing/2014/main" id="{55E3E84B-D043-47B8-AEB9-87C3E7C387F8}"/>
               </a:ext>
             </a:extLst>
           </p:cNvPr>
@@ -3520,7 +5144,11 @@
           <a:bodyPr/>
           <a:lstStyle/>
           <a:p>
-            <a:endParaRPr lang="en-IN"/>
+            <a:r>
+              <a:rPr lang="en-US" dirty="0"/>
+              <a:t>What does it mean by ‘framework’?</a:t>
+            </a:r>
+            <a:endParaRPr lang="en-IN" dirty="0"/>
           </a:p>
         </p:txBody>
       </p:sp>
@@ -3529,7 +5157,7 @@
           <p:cNvPr id="3" name="Content Placeholder 2">
             <a:extLst>
               <a:ext uri="{FF2B5EF4-FFF2-40B4-BE49-F238E27FC236}">
-                <a16:creationId xmlns:a16="http://schemas.microsoft.com/office/drawing/2014/main" id="{D3364196-2F36-4355-880A-07195102147C}"/>
+                <a16:creationId xmlns:a16="http://schemas.microsoft.com/office/drawing/2014/main" id="{9CBAD18A-2BB5-44B5-89A7-E203A0222D64}"/>
               </a:ext>
             </a:extLst>
           </p:cNvPr>
@@ -3545,14 +5173,18 @@
           <a:bodyPr/>
           <a:lstStyle/>
           <a:p>
-            <a:endParaRPr lang="en-IN"/>
+            <a:r>
+              <a:rPr lang="en-US" dirty="0"/>
+              <a:t>A set of rules/best practices/standards that are decided for the most optimized and error-free result.</a:t>
+            </a:r>
+            <a:endParaRPr lang="en-IN" dirty="0"/>
           </a:p>
         </p:txBody>
       </p:sp>
     </p:spTree>
     <p:extLst>
       <p:ext uri="{BB962C8B-B14F-4D97-AF65-F5344CB8AC3E}">
-        <p14:creationId xmlns:p14="http://schemas.microsoft.com/office/powerpoint/2010/main" val="3406401442"/>
+        <p14:creationId xmlns:p14="http://schemas.microsoft.com/office/powerpoint/2010/main" val="2535833527"/>
       </p:ext>
     </p:extLst>
   </p:cSld>
@@ -3584,7 +5216,7 @@
           <p:cNvPr id="2" name="Title 1">
             <a:extLst>
               <a:ext uri="{FF2B5EF4-FFF2-40B4-BE49-F238E27FC236}">
-                <a16:creationId xmlns:a16="http://schemas.microsoft.com/office/drawing/2014/main" id="{3E3D8F06-546F-4B18-8537-27B1A4FA2F19}"/>
+                <a16:creationId xmlns:a16="http://schemas.microsoft.com/office/drawing/2014/main" id="{1306788B-B371-4922-84DE-5FB7023195A6}"/>
               </a:ext>
             </a:extLst>
           </p:cNvPr>
@@ -3600,7 +5232,11 @@
           <a:bodyPr/>
           <a:lstStyle/>
           <a:p>
-            <a:endParaRPr lang="en-IN"/>
+            <a:r>
+              <a:rPr lang="en-US" dirty="0"/>
+              <a:t>What is flask?</a:t>
+            </a:r>
+            <a:endParaRPr lang="en-IN" dirty="0"/>
           </a:p>
         </p:txBody>
       </p:sp>
@@ -3609,7 +5245,7 @@
           <p:cNvPr id="3" name="Content Placeholder 2">
             <a:extLst>
               <a:ext uri="{FF2B5EF4-FFF2-40B4-BE49-F238E27FC236}">
-                <a16:creationId xmlns:a16="http://schemas.microsoft.com/office/drawing/2014/main" id="{2F1851FC-813A-4706-913F-950064A26641}"/>
+                <a16:creationId xmlns:a16="http://schemas.microsoft.com/office/drawing/2014/main" id="{F2024EDB-6B47-4736-B7AD-A648D2F51156}"/>
               </a:ext>
             </a:extLst>
           </p:cNvPr>
@@ -3625,14 +5261,18 @@
           <a:bodyPr/>
           <a:lstStyle/>
           <a:p>
-            <a:endParaRPr lang="en-IN"/>
+            <a:r>
+              <a:rPr lang="en-US" dirty="0"/>
+              <a:t>Flask is a python based lightweight web-framework.</a:t>
+            </a:r>
+            <a:endParaRPr lang="en-IN" dirty="0"/>
           </a:p>
         </p:txBody>
       </p:sp>
     </p:spTree>
     <p:extLst>
       <p:ext uri="{BB962C8B-B14F-4D97-AF65-F5344CB8AC3E}">
-        <p14:creationId xmlns:p14="http://schemas.microsoft.com/office/powerpoint/2010/main" val="3034930460"/>
+        <p14:creationId xmlns:p14="http://schemas.microsoft.com/office/powerpoint/2010/main" val="2351437984"/>
       </p:ext>
     </p:extLst>
   </p:cSld>
@@ -3664,7 +5304,7 @@
           <p:cNvPr id="2" name="Title 1">
             <a:extLst>
               <a:ext uri="{FF2B5EF4-FFF2-40B4-BE49-F238E27FC236}">
-                <a16:creationId xmlns:a16="http://schemas.microsoft.com/office/drawing/2014/main" id="{333C2EFF-F1F3-43A8-B7CC-244B17EFBE11}"/>
+                <a16:creationId xmlns:a16="http://schemas.microsoft.com/office/drawing/2014/main" id="{F24CE067-215C-49D2-A696-E763AF25B574}"/>
               </a:ext>
             </a:extLst>
           </p:cNvPr>
@@ -3680,39 +5320,48 @@
           <a:bodyPr/>
           <a:lstStyle/>
           <a:p>
-            <a:endParaRPr lang="en-IN"/>
-          </a:p>
-        </p:txBody>
-      </p:sp>
-      <p:sp>
-        <p:nvSpPr>
-          <p:cNvPr id="3" name="Content Placeholder 2">
-            <a:extLst>
-              <a:ext uri="{FF2B5EF4-FFF2-40B4-BE49-F238E27FC236}">
-                <a16:creationId xmlns:a16="http://schemas.microsoft.com/office/drawing/2014/main" id="{B5FE5451-D8AB-4702-B715-1D6420FAA3ED}"/>
-              </a:ext>
-            </a:extLst>
-          </p:cNvPr>
-          <p:cNvSpPr>
-            <a:spLocks noGrp="1"/>
-          </p:cNvSpPr>
-          <p:nvPr>
-            <p:ph idx="1"/>
-          </p:nvPr>
-        </p:nvSpPr>
-        <p:spPr/>
-        <p:txBody>
-          <a:bodyPr/>
-          <a:lstStyle/>
-          <a:p>
-            <a:endParaRPr lang="en-IN"/>
-          </a:p>
-        </p:txBody>
-      </p:sp>
+            <a:r>
+              <a:rPr lang="en-US" dirty="0"/>
+              <a:t>Hello World</a:t>
+            </a:r>
+            <a:endParaRPr lang="en-IN" dirty="0"/>
+          </a:p>
+        </p:txBody>
+      </p:sp>
+      <p:pic>
+        <p:nvPicPr>
+          <p:cNvPr id="5" name="Picture 4">
+            <a:extLst>
+              <a:ext uri="{FF2B5EF4-FFF2-40B4-BE49-F238E27FC236}">
+                <a16:creationId xmlns:a16="http://schemas.microsoft.com/office/drawing/2014/main" id="{1133433D-A779-4C8A-B20E-456C423527E3}"/>
+              </a:ext>
+            </a:extLst>
+          </p:cNvPr>
+          <p:cNvPicPr>
+            <a:picLocks noChangeAspect="1"/>
+          </p:cNvPicPr>
+          <p:nvPr/>
+        </p:nvPicPr>
+        <p:blipFill>
+          <a:blip r:embed="rId3"/>
+          <a:stretch>
+            <a:fillRect/>
+          </a:stretch>
+        </p:blipFill>
+        <p:spPr>
+          <a:xfrm>
+            <a:off x="838200" y="1690688"/>
+            <a:ext cx="10730246" cy="4802187"/>
+          </a:xfrm>
+          <a:prstGeom prst="rect">
+            <a:avLst/>
+          </a:prstGeom>
+        </p:spPr>
+      </p:pic>
     </p:spTree>
     <p:extLst>
       <p:ext uri="{BB962C8B-B14F-4D97-AF65-F5344CB8AC3E}">
-        <p14:creationId xmlns:p14="http://schemas.microsoft.com/office/powerpoint/2010/main" val="3181666133"/>
+        <p14:creationId xmlns:p14="http://schemas.microsoft.com/office/powerpoint/2010/main" val="1778978399"/>
       </p:ext>
     </p:extLst>
   </p:cSld>
@@ -3725,6 +5374,14 @@
 <file path=ppt/slides/slide6.xml><?xml version="1.0" encoding="utf-8"?>
 <p:sld xmlns:a="http://schemas.openxmlformats.org/drawingml/2006/main" xmlns:r="http://schemas.openxmlformats.org/officeDocument/2006/relationships" xmlns:p="http://schemas.openxmlformats.org/presentationml/2006/main">
   <p:cSld>
+    <p:bg>
+      <p:bgPr>
+        <a:solidFill>
+          <a:schemeClr val="bg1"/>
+        </a:solidFill>
+        <a:effectLst/>
+      </p:bgPr>
+    </p:bg>
     <p:spTree>
       <p:nvGrpSpPr>
         <p:cNvPr id="1" name=""/>
@@ -3744,7 +5401,7 @@
           <p:cNvPr id="2" name="Title 1">
             <a:extLst>
               <a:ext uri="{FF2B5EF4-FFF2-40B4-BE49-F238E27FC236}">
-                <a16:creationId xmlns:a16="http://schemas.microsoft.com/office/drawing/2014/main" id="{05264785-B745-4B84-95C0-E9644ECCAD6D}"/>
+                <a16:creationId xmlns:a16="http://schemas.microsoft.com/office/drawing/2014/main" id="{90BDE072-0389-4885-9B12-BBAFB9A4995B}"/>
               </a:ext>
             </a:extLst>
           </p:cNvPr>
@@ -3760,39 +5417,92 @@
           <a:bodyPr/>
           <a:lstStyle/>
           <a:p>
-            <a:endParaRPr lang="en-IN"/>
-          </a:p>
-        </p:txBody>
-      </p:sp>
-      <p:sp>
-        <p:nvSpPr>
-          <p:cNvPr id="3" name="Content Placeholder 2">
-            <a:extLst>
-              <a:ext uri="{FF2B5EF4-FFF2-40B4-BE49-F238E27FC236}">
-                <a16:creationId xmlns:a16="http://schemas.microsoft.com/office/drawing/2014/main" id="{FA382D8F-8937-4EF9-A12E-F7616DAEE0F3}"/>
-              </a:ext>
-            </a:extLst>
-          </p:cNvPr>
-          <p:cNvSpPr>
-            <a:spLocks noGrp="1"/>
-          </p:cNvSpPr>
-          <p:nvPr>
-            <p:ph idx="1"/>
-          </p:nvPr>
-        </p:nvSpPr>
-        <p:spPr/>
-        <p:txBody>
-          <a:bodyPr/>
-          <a:lstStyle/>
-          <a:p>
-            <a:endParaRPr lang="en-IN"/>
+            <a:r>
+              <a:rPr lang="en-US" dirty="0"/>
+              <a:t>World, Hello</a:t>
+            </a:r>
+            <a:endParaRPr lang="en-IN" dirty="0"/>
+          </a:p>
+        </p:txBody>
+      </p:sp>
+      <p:pic>
+        <p:nvPicPr>
+          <p:cNvPr id="4" name="Picture 3">
+            <a:extLst>
+              <a:ext uri="{FF2B5EF4-FFF2-40B4-BE49-F238E27FC236}">
+                <a16:creationId xmlns:a16="http://schemas.microsoft.com/office/drawing/2014/main" id="{74FAFADF-37CA-45DB-B749-663F2775BAE6}"/>
+              </a:ext>
+            </a:extLst>
+          </p:cNvPr>
+          <p:cNvPicPr>
+            <a:picLocks noChangeAspect="1"/>
+          </p:cNvPicPr>
+          <p:nvPr/>
+        </p:nvPicPr>
+        <p:blipFill>
+          <a:blip r:embed="rId2"/>
+          <a:stretch>
+            <a:fillRect/>
+          </a:stretch>
+        </p:blipFill>
+        <p:spPr>
+          <a:xfrm>
+            <a:off x="838199" y="1873458"/>
+            <a:ext cx="10515600" cy="1898123"/>
+          </a:xfrm>
+          <a:prstGeom prst="rect">
+            <a:avLst/>
+          </a:prstGeom>
+        </p:spPr>
+      </p:pic>
+      <p:sp>
+        <p:nvSpPr>
+          <p:cNvPr id="7" name="TextBox 6">
+            <a:extLst>
+              <a:ext uri="{FF2B5EF4-FFF2-40B4-BE49-F238E27FC236}">
+                <a16:creationId xmlns:a16="http://schemas.microsoft.com/office/drawing/2014/main" id="{56973950-809C-4E08-BC3B-DE34D107E7CC}"/>
+              </a:ext>
+            </a:extLst>
+          </p:cNvPr>
+          <p:cNvSpPr txBox="1"/>
+          <p:nvPr/>
+        </p:nvSpPr>
+        <p:spPr>
+          <a:xfrm>
+            <a:off x="838199" y="4077323"/>
+            <a:ext cx="10515600" cy="1200329"/>
+          </a:xfrm>
+          <a:prstGeom prst="rect">
+            <a:avLst/>
+          </a:prstGeom>
+          <a:noFill/>
+        </p:spPr>
+        <p:txBody>
+          <a:bodyPr wrap="square" rtlCol="0">
+            <a:spAutoFit/>
+          </a:bodyPr>
+          <a:lstStyle/>
+          <a:p>
+            <a:r>
+              <a:rPr lang="en-IN" sz="2400" dirty="0"/>
+              <a:t>For Externally Visible Server</a:t>
+            </a:r>
+          </a:p>
+          <a:p>
+            <a:endParaRPr lang="en-IN" sz="2400" dirty="0"/>
+          </a:p>
+          <a:p>
+            <a:r>
+              <a:rPr lang="en-IN" sz="2400" dirty="0"/>
+              <a:t>flask run --host=0.0.0.0</a:t>
+            </a:r>
           </a:p>
         </p:txBody>
       </p:sp>
     </p:spTree>
     <p:extLst>
       <p:ext uri="{BB962C8B-B14F-4D97-AF65-F5344CB8AC3E}">
-        <p14:creationId xmlns:p14="http://schemas.microsoft.com/office/powerpoint/2010/main" val="1355206570"/>
+        <p14:creationId xmlns:p14="http://schemas.microsoft.com/office/powerpoint/2010/main" val="3601016001"/>
       </p:ext>
     </p:extLst>
   </p:cSld>
@@ -3824,7 +5534,7 @@
           <p:cNvPr id="2" name="Title 1">
             <a:extLst>
               <a:ext uri="{FF2B5EF4-FFF2-40B4-BE49-F238E27FC236}">
-                <a16:creationId xmlns:a16="http://schemas.microsoft.com/office/drawing/2014/main" id="{0E6EECE6-6653-413D-9D00-4DB067906504}"/>
+                <a16:creationId xmlns:a16="http://schemas.microsoft.com/office/drawing/2014/main" id="{CCC54396-17CB-476E-AED3-7F1ED106854F}"/>
               </a:ext>
             </a:extLst>
           </p:cNvPr>
@@ -3840,7 +5550,11 @@
           <a:bodyPr/>
           <a:lstStyle/>
           <a:p>
-            <a:endParaRPr lang="en-IN"/>
+            <a:r>
+              <a:rPr lang="en-US" dirty="0"/>
+              <a:t>Environment: Societies and situations</a:t>
+            </a:r>
+            <a:endParaRPr lang="en-IN" dirty="0"/>
           </a:p>
         </p:txBody>
       </p:sp>
@@ -3849,7 +5563,7 @@
           <p:cNvPr id="3" name="Content Placeholder 2">
             <a:extLst>
               <a:ext uri="{FF2B5EF4-FFF2-40B4-BE49-F238E27FC236}">
-                <a16:creationId xmlns:a16="http://schemas.microsoft.com/office/drawing/2014/main" id="{CE46553C-865C-4FA4-8123-E90798149451}"/>
+                <a16:creationId xmlns:a16="http://schemas.microsoft.com/office/drawing/2014/main" id="{FE56CAAE-EB2A-4D8D-94D4-6F3474E6BB0B}"/>
               </a:ext>
             </a:extLst>
           </p:cNvPr>
@@ -3865,14 +5579,29 @@
           <a:bodyPr/>
           <a:lstStyle/>
           <a:p>
-            <a:endParaRPr lang="en-IN"/>
+            <a:r>
+              <a:rPr lang="en-US" dirty="0"/>
+              <a:t>What does it mean by “Environment”?</a:t>
+            </a:r>
+          </a:p>
+          <a:p>
+            <a:r>
+              <a:rPr lang="en-US" dirty="0"/>
+              <a:t>What is the difference between “Development env.” and “Production env.”?</a:t>
+            </a:r>
+          </a:p>
+          <a:p>
+            <a:r>
+              <a:rPr lang="en-US" dirty="0"/>
+              <a:t>What environment is your flask web application running in right now?</a:t>
+            </a:r>
           </a:p>
         </p:txBody>
       </p:sp>
     </p:spTree>
     <p:extLst>
       <p:ext uri="{BB962C8B-B14F-4D97-AF65-F5344CB8AC3E}">
-        <p14:creationId xmlns:p14="http://schemas.microsoft.com/office/powerpoint/2010/main" val="3370814465"/>
+        <p14:creationId xmlns:p14="http://schemas.microsoft.com/office/powerpoint/2010/main" val="1470554262"/>
       </p:ext>
     </p:extLst>
   </p:cSld>
@@ -3904,7 +5633,7 @@
           <p:cNvPr id="2" name="Title 1">
             <a:extLst>
               <a:ext uri="{FF2B5EF4-FFF2-40B4-BE49-F238E27FC236}">
-                <a16:creationId xmlns:a16="http://schemas.microsoft.com/office/drawing/2014/main" id="{C54C6F14-17F2-4FD9-8759-81BED54677EA}"/>
+                <a16:creationId xmlns:a16="http://schemas.microsoft.com/office/drawing/2014/main" id="{25E55093-8414-4BE7-B425-9D04D5C95DCE}"/>
               </a:ext>
             </a:extLst>
           </p:cNvPr>
@@ -3920,7 +5649,11 @@
           <a:bodyPr/>
           <a:lstStyle/>
           <a:p>
-            <a:endParaRPr lang="en-IN"/>
+            <a:r>
+              <a:rPr lang="en-US" dirty="0"/>
+              <a:t>Let’s come home for now…</a:t>
+            </a:r>
+            <a:endParaRPr lang="en-IN" dirty="0"/>
           </a:p>
         </p:txBody>
       </p:sp>
@@ -3929,7 +5662,7 @@
           <p:cNvPr id="3" name="Content Placeholder 2">
             <a:extLst>
               <a:ext uri="{FF2B5EF4-FFF2-40B4-BE49-F238E27FC236}">
-                <a16:creationId xmlns:a16="http://schemas.microsoft.com/office/drawing/2014/main" id="{6E3A81FD-E287-481A-AB18-E1C2C9E4E3B9}"/>
+                <a16:creationId xmlns:a16="http://schemas.microsoft.com/office/drawing/2014/main" id="{B13CC24E-816D-4C1B-ADAE-14E1627D6E14}"/>
               </a:ext>
             </a:extLst>
           </p:cNvPr>
@@ -3945,14 +5678,48 @@
           <a:bodyPr/>
           <a:lstStyle/>
           <a:p>
-            <a:endParaRPr lang="en-IN"/>
-          </a:p>
-        </p:txBody>
-      </p:sp>
+            <a:r>
+              <a:rPr lang="en-US" dirty="0"/>
+              <a:t>Switch to the development environment.</a:t>
+            </a:r>
+            <a:endParaRPr lang="en-IN" dirty="0"/>
+          </a:p>
+        </p:txBody>
+      </p:sp>
+      <p:pic>
+        <p:nvPicPr>
+          <p:cNvPr id="4" name="Picture 3">
+            <a:extLst>
+              <a:ext uri="{FF2B5EF4-FFF2-40B4-BE49-F238E27FC236}">
+                <a16:creationId xmlns:a16="http://schemas.microsoft.com/office/drawing/2014/main" id="{8B855A5E-DFDE-49BE-8030-B4AEF485CBF6}"/>
+              </a:ext>
+            </a:extLst>
+          </p:cNvPr>
+          <p:cNvPicPr>
+            <a:picLocks noChangeAspect="1"/>
+          </p:cNvPicPr>
+          <p:nvPr/>
+        </p:nvPicPr>
+        <p:blipFill>
+          <a:blip r:embed="rId2"/>
+          <a:stretch>
+            <a:fillRect/>
+          </a:stretch>
+        </p:blipFill>
+        <p:spPr>
+          <a:xfrm>
+            <a:off x="908153" y="2371725"/>
+            <a:ext cx="8251031" cy="2170295"/>
+          </a:xfrm>
+          <a:prstGeom prst="rect">
+            <a:avLst/>
+          </a:prstGeom>
+        </p:spPr>
+      </p:pic>
     </p:spTree>
     <p:extLst>
       <p:ext uri="{BB962C8B-B14F-4D97-AF65-F5344CB8AC3E}">
-        <p14:creationId xmlns:p14="http://schemas.microsoft.com/office/powerpoint/2010/main" val="604145472"/>
+        <p14:creationId xmlns:p14="http://schemas.microsoft.com/office/powerpoint/2010/main" val="2451331164"/>
       </p:ext>
     </p:extLst>
   </p:cSld>
@@ -3984,7 +5751,7 @@
           <p:cNvPr id="2" name="Title 1">
             <a:extLst>
               <a:ext uri="{FF2B5EF4-FFF2-40B4-BE49-F238E27FC236}">
-                <a16:creationId xmlns:a16="http://schemas.microsoft.com/office/drawing/2014/main" id="{E2CCADAF-A4E8-427F-B865-884470DD748C}"/>
+                <a16:creationId xmlns:a16="http://schemas.microsoft.com/office/drawing/2014/main" id="{80F7D2B9-8C91-4313-895B-95A8D67A06FD}"/>
               </a:ext>
             </a:extLst>
           </p:cNvPr>
@@ -4000,7 +5767,11 @@
           <a:bodyPr/>
           <a:lstStyle/>
           <a:p>
-            <a:endParaRPr lang="en-IN"/>
+            <a:r>
+              <a:rPr lang="en-US" dirty="0"/>
+              <a:t>Adv. Of Flask Dev env</a:t>
+            </a:r>
+            <a:endParaRPr lang="en-IN" dirty="0"/>
           </a:p>
         </p:txBody>
       </p:sp>
@@ -4009,7 +5780,7 @@
           <p:cNvPr id="3" name="Content Placeholder 2">
             <a:extLst>
               <a:ext uri="{FF2B5EF4-FFF2-40B4-BE49-F238E27FC236}">
-                <a16:creationId xmlns:a16="http://schemas.microsoft.com/office/drawing/2014/main" id="{905CB9D6-559C-4B76-A0E7-6F900610E836}"/>
+                <a16:creationId xmlns:a16="http://schemas.microsoft.com/office/drawing/2014/main" id="{0BE30993-B756-4236-8189-612009926D0C}"/>
               </a:ext>
             </a:extLst>
           </p:cNvPr>
@@ -4025,14 +5796,28 @@
           <a:bodyPr/>
           <a:lstStyle/>
           <a:p>
-            <a:endParaRPr lang="en-IN"/>
+            <a:r>
+              <a:rPr lang="en-US" dirty="0"/>
+              <a:t>You get debugger on the browser.</a:t>
+            </a:r>
+          </a:p>
+          <a:p>
+            <a:r>
+              <a:rPr lang="en-US" dirty="0"/>
+              <a:t>You get </a:t>
+            </a:r>
+            <a:r>
+              <a:rPr lang="en-US"/>
+              <a:t>hot-reload.</a:t>
+            </a:r>
+            <a:endParaRPr lang="en-IN" dirty="0"/>
           </a:p>
         </p:txBody>
       </p:sp>
     </p:spTree>
     <p:extLst>
       <p:ext uri="{BB962C8B-B14F-4D97-AF65-F5344CB8AC3E}">
-        <p14:creationId xmlns:p14="http://schemas.microsoft.com/office/powerpoint/2010/main" val="2131545566"/>
+        <p14:creationId xmlns:p14="http://schemas.microsoft.com/office/powerpoint/2010/main" val="2019011235"/>
       </p:ext>
     </p:extLst>
   </p:cSld>
@@ -4335,4 +6120,299 @@
     </a:ext>
   </a:extLst>
 </a:theme>
+</file>
+
+<file path=ppt/theme/theme2.xml><?xml version="1.0" encoding="utf-8"?>
+<a:theme xmlns:a="http://schemas.openxmlformats.org/drawingml/2006/main" name="Office Theme">
+  <a:themeElements>
+    <a:clrScheme name="Office">
+      <a:dk1>
+        <a:sysClr val="windowText" lastClr="000000"/>
+      </a:dk1>
+      <a:lt1>
+        <a:sysClr val="window" lastClr="FFFFFF"/>
+      </a:lt1>
+      <a:dk2>
+        <a:srgbClr val="44546A"/>
+      </a:dk2>
+      <a:lt2>
+        <a:srgbClr val="E7E6E6"/>
+      </a:lt2>
+      <a:accent1>
+        <a:srgbClr val="4472C4"/>
+      </a:accent1>
+      <a:accent2>
+        <a:srgbClr val="ED7D31"/>
+      </a:accent2>
+      <a:accent3>
+        <a:srgbClr val="A5A5A5"/>
+      </a:accent3>
+      <a:accent4>
+        <a:srgbClr val="FFC000"/>
+      </a:accent4>
+      <a:accent5>
+        <a:srgbClr val="5B9BD5"/>
+      </a:accent5>
+      <a:accent6>
+        <a:srgbClr val="70AD47"/>
+      </a:accent6>
+      <a:hlink>
+        <a:srgbClr val="0563C1"/>
+      </a:hlink>
+      <a:folHlink>
+        <a:srgbClr val="954F72"/>
+      </a:folHlink>
+    </a:clrScheme>
+    <a:fontScheme name="Office">
+      <a:majorFont>
+        <a:latin typeface="Calibri Light" panose="020F0302020204030204"/>
+        <a:ea typeface=""/>
+        <a:cs typeface=""/>
+        <a:font script="Jpan" typeface="游ゴシック Light"/>
+        <a:font script="Hang" typeface="맑은 고딕"/>
+        <a:font script="Hans" typeface="等线 Light"/>
+        <a:font script="Hant" typeface="新細明體"/>
+        <a:font script="Arab" typeface="Times New Roman"/>
+        <a:font script="Hebr" typeface="Times New Roman"/>
+        <a:font script="Thai" typeface="Angsana New"/>
+        <a:font script="Ethi" typeface="Nyala"/>
+        <a:font script="Beng" typeface="Vrinda"/>
+        <a:font script="Gujr" typeface="Shruti"/>
+        <a:font script="Khmr" typeface="MoolBoran"/>
+        <a:font script="Knda" typeface="Tunga"/>
+        <a:font script="Guru" typeface="Raavi"/>
+        <a:font script="Cans" typeface="Euphemia"/>
+        <a:font script="Cher" typeface="Plantagenet Cherokee"/>
+        <a:font script="Yiii" typeface="Microsoft Yi Baiti"/>
+        <a:font script="Tibt" typeface="Microsoft Himalaya"/>
+        <a:font script="Thaa" typeface="MV Boli"/>
+        <a:font script="Deva" typeface="Mangal"/>
+        <a:font script="Telu" typeface="Gautami"/>
+        <a:font script="Taml" typeface="Latha"/>
+        <a:font script="Syrc" typeface="Estrangelo Edessa"/>
+        <a:font script="Orya" typeface="Kalinga"/>
+        <a:font script="Mlym" typeface="Kartika"/>
+        <a:font script="Laoo" typeface="DokChampa"/>
+        <a:font script="Sinh" typeface="Iskoola Pota"/>
+        <a:font script="Mong" typeface="Mongolian Baiti"/>
+        <a:font script="Viet" typeface="Times New Roman"/>
+        <a:font script="Uigh" typeface="Microsoft Uighur"/>
+        <a:font script="Geor" typeface="Sylfaen"/>
+        <a:font script="Armn" typeface="Arial"/>
+        <a:font script="Bugi" typeface="Leelawadee UI"/>
+        <a:font script="Bopo" typeface="Microsoft JhengHei"/>
+        <a:font script="Java" typeface="Javanese Text"/>
+        <a:font script="Lisu" typeface="Segoe UI"/>
+        <a:font script="Mymr" typeface="Myanmar Text"/>
+        <a:font script="Nkoo" typeface="Ebrima"/>
+        <a:font script="Olck" typeface="Nirmala UI"/>
+        <a:font script="Osma" typeface="Ebrima"/>
+        <a:font script="Phag" typeface="Phagspa"/>
+        <a:font script="Syrn" typeface="Estrangelo Edessa"/>
+        <a:font script="Syrj" typeface="Estrangelo Edessa"/>
+        <a:font script="Syre" typeface="Estrangelo Edessa"/>
+        <a:font script="Sora" typeface="Nirmala UI"/>
+        <a:font script="Tale" typeface="Microsoft Tai Le"/>
+        <a:font script="Talu" typeface="Microsoft New Tai Lue"/>
+        <a:font script="Tfng" typeface="Ebrima"/>
+      </a:majorFont>
+      <a:minorFont>
+        <a:latin typeface="Calibri" panose="020F0502020204030204"/>
+        <a:ea typeface=""/>
+        <a:cs typeface=""/>
+        <a:font script="Jpan" typeface="游ゴシック"/>
+        <a:font script="Hang" typeface="맑은 고딕"/>
+        <a:font script="Hans" typeface="等线"/>
+        <a:font script="Hant" typeface="新細明體"/>
+        <a:font script="Arab" typeface="Arial"/>
+        <a:font script="Hebr" typeface="Arial"/>
+        <a:font script="Thai" typeface="Cordia New"/>
+        <a:font script="Ethi" typeface="Nyala"/>
+        <a:font script="Beng" typeface="Vrinda"/>
+        <a:font script="Gujr" typeface="Shruti"/>
+        <a:font script="Khmr" typeface="DaunPenh"/>
+        <a:font script="Knda" typeface="Tunga"/>
+        <a:font script="Guru" typeface="Raavi"/>
+        <a:font script="Cans" typeface="Euphemia"/>
+        <a:font script="Cher" typeface="Plantagenet Cherokee"/>
+        <a:font script="Yiii" typeface="Microsoft Yi Baiti"/>
+        <a:font script="Tibt" typeface="Microsoft Himalaya"/>
+        <a:font script="Thaa" typeface="MV Boli"/>
+        <a:font script="Deva" typeface="Mangal"/>
+        <a:font script="Telu" typeface="Gautami"/>
+        <a:font script="Taml" typeface="Latha"/>
+        <a:font script="Syrc" typeface="Estrangelo Edessa"/>
+        <a:font script="Orya" typeface="Kalinga"/>
+        <a:font script="Mlym" typeface="Kartika"/>
+        <a:font script="Laoo" typeface="DokChampa"/>
+        <a:font script="Sinh" typeface="Iskoola Pota"/>
+        <a:font script="Mong" typeface="Mongolian Baiti"/>
+        <a:font script="Viet" typeface="Arial"/>
+        <a:font script="Uigh" typeface="Microsoft Uighur"/>
+        <a:font script="Geor" typeface="Sylfaen"/>
+        <a:font script="Armn" typeface="Arial"/>
+        <a:font script="Bugi" typeface="Leelawadee UI"/>
+        <a:font script="Bopo" typeface="Microsoft JhengHei"/>
+        <a:font script="Java" typeface="Javanese Text"/>
+        <a:font script="Lisu" typeface="Segoe UI"/>
+        <a:font script="Mymr" typeface="Myanmar Text"/>
+        <a:font script="Nkoo" typeface="Ebrima"/>
+        <a:font script="Olck" typeface="Nirmala UI"/>
+        <a:font script="Osma" typeface="Ebrima"/>
+        <a:font script="Phag" typeface="Phagspa"/>
+        <a:font script="Syrn" typeface="Estrangelo Edessa"/>
+        <a:font script="Syrj" typeface="Estrangelo Edessa"/>
+        <a:font script="Syre" typeface="Estrangelo Edessa"/>
+        <a:font script="Sora" typeface="Nirmala UI"/>
+        <a:font script="Tale" typeface="Microsoft Tai Le"/>
+        <a:font script="Talu" typeface="Microsoft New Tai Lue"/>
+        <a:font script="Tfng" typeface="Ebrima"/>
+      </a:minorFont>
+    </a:fontScheme>
+    <a:fmtScheme name="Office">
+      <a:fillStyleLst>
+        <a:solidFill>
+          <a:schemeClr val="phClr"/>
+        </a:solidFill>
+        <a:gradFill rotWithShape="1">
+          <a:gsLst>
+            <a:gs pos="0">
+              <a:schemeClr val="phClr">
+                <a:lumMod val="110000"/>
+                <a:satMod val="105000"/>
+                <a:tint val="67000"/>
+              </a:schemeClr>
+            </a:gs>
+            <a:gs pos="50000">
+              <a:schemeClr val="phClr">
+                <a:lumMod val="105000"/>
+                <a:satMod val="103000"/>
+                <a:tint val="73000"/>
+              </a:schemeClr>
+            </a:gs>
+            <a:gs pos="100000">
+              <a:schemeClr val="phClr">
+                <a:lumMod val="105000"/>
+                <a:satMod val="109000"/>
+                <a:tint val="81000"/>
+              </a:schemeClr>
+            </a:gs>
+          </a:gsLst>
+          <a:lin ang="5400000" scaled="0"/>
+        </a:gradFill>
+        <a:gradFill rotWithShape="1">
+          <a:gsLst>
+            <a:gs pos="0">
+              <a:schemeClr val="phClr">
+                <a:satMod val="103000"/>
+                <a:lumMod val="102000"/>
+                <a:tint val="94000"/>
+              </a:schemeClr>
+            </a:gs>
+            <a:gs pos="50000">
+              <a:schemeClr val="phClr">
+                <a:satMod val="110000"/>
+                <a:lumMod val="100000"/>
+                <a:shade val="100000"/>
+              </a:schemeClr>
+            </a:gs>
+            <a:gs pos="100000">
+              <a:schemeClr val="phClr">
+                <a:lumMod val="99000"/>
+                <a:satMod val="120000"/>
+                <a:shade val="78000"/>
+              </a:schemeClr>
+            </a:gs>
+          </a:gsLst>
+          <a:lin ang="5400000" scaled="0"/>
+        </a:gradFill>
+      </a:fillStyleLst>
+      <a:lnStyleLst>
+        <a:ln w="6350" cap="flat" cmpd="sng" algn="ctr">
+          <a:solidFill>
+            <a:schemeClr val="phClr"/>
+          </a:solidFill>
+          <a:prstDash val="solid"/>
+          <a:miter lim="800000"/>
+        </a:ln>
+        <a:ln w="12700" cap="flat" cmpd="sng" algn="ctr">
+          <a:solidFill>
+            <a:schemeClr val="phClr"/>
+          </a:solidFill>
+          <a:prstDash val="solid"/>
+          <a:miter lim="800000"/>
+        </a:ln>
+        <a:ln w="19050" cap="flat" cmpd="sng" algn="ctr">
+          <a:solidFill>
+            <a:schemeClr val="phClr"/>
+          </a:solidFill>
+          <a:prstDash val="solid"/>
+          <a:miter lim="800000"/>
+        </a:ln>
+      </a:lnStyleLst>
+      <a:effectStyleLst>
+        <a:effectStyle>
+          <a:effectLst/>
+        </a:effectStyle>
+        <a:effectStyle>
+          <a:effectLst/>
+        </a:effectStyle>
+        <a:effectStyle>
+          <a:effectLst>
+            <a:outerShdw blurRad="57150" dist="19050" dir="5400000" algn="ctr" rotWithShape="0">
+              <a:srgbClr val="000000">
+                <a:alpha val="63000"/>
+              </a:srgbClr>
+            </a:outerShdw>
+          </a:effectLst>
+        </a:effectStyle>
+      </a:effectStyleLst>
+      <a:bgFillStyleLst>
+        <a:solidFill>
+          <a:schemeClr val="phClr"/>
+        </a:solidFill>
+        <a:solidFill>
+          <a:schemeClr val="phClr">
+            <a:tint val="95000"/>
+            <a:satMod val="170000"/>
+          </a:schemeClr>
+        </a:solidFill>
+        <a:gradFill rotWithShape="1">
+          <a:gsLst>
+            <a:gs pos="0">
+              <a:schemeClr val="phClr">
+                <a:tint val="93000"/>
+                <a:satMod val="150000"/>
+                <a:shade val="98000"/>
+                <a:lumMod val="102000"/>
+              </a:schemeClr>
+            </a:gs>
+            <a:gs pos="50000">
+              <a:schemeClr val="phClr">
+                <a:tint val="98000"/>
+                <a:satMod val="130000"/>
+                <a:shade val="90000"/>
+                <a:lumMod val="103000"/>
+              </a:schemeClr>
+            </a:gs>
+            <a:gs pos="100000">
+              <a:schemeClr val="phClr">
+                <a:shade val="63000"/>
+                <a:satMod val="120000"/>
+              </a:schemeClr>
+            </a:gs>
+          </a:gsLst>
+          <a:lin ang="5400000" scaled="0"/>
+        </a:gradFill>
+      </a:bgFillStyleLst>
+    </a:fmtScheme>
+  </a:themeElements>
+  <a:objectDefaults/>
+  <a:extraClrSchemeLst/>
+  <a:extLst>
+    <a:ext uri="{05A4C25C-085E-4340-85A3-A5531E510DB2}">
+      <thm15:themeFamily xmlns:thm15="http://schemas.microsoft.com/office/thememl/2012/main" name="Office Theme" id="{62F939B6-93AF-4DB8-9C6B-D6C7DFDC589F}" vid="{4A3C46E8-61CC-4603-A589-7422A47A8E4A}"/>
+    </a:ext>
+  </a:extLst>
+</a:theme>
 </file>
</xml_diff>